<commit_message>
aggiornamento candidatura e diario di bordo
</commit_message>
<xml_diff>
--- a/DIARIO DI BORDO/Diario di bordo.pptx
+++ b/DIARIO DI BORDO/Diario di bordo.pptx
@@ -4,6 +4,9 @@
   <p:sldMasterIdLst>
     <p:sldMasterId id="2147483648" r:id="rId1"/>
   </p:sldMasterIdLst>
+  <p:notesMasterIdLst>
+    <p:notesMasterId r:id="rId6"/>
+  </p:notesMasterIdLst>
   <p:sldIdLst>
     <p:sldId id="256" r:id="rId2"/>
     <p:sldId id="257" r:id="rId3"/>
@@ -13,10 +16,6 @@
   <p:sldSz cx="18288000" cy="10287000"/>
   <p:notesSz cx="6858000" cy="9144000"/>
   <p:embeddedFontLst>
-    <p:embeddedFont>
-      <p:font typeface="Fredoka" panose="020B0604020202020204" charset="0"/>
-      <p:regular r:id="rId6"/>
-    </p:embeddedFont>
     <p:embeddedFont>
       <p:font typeface="Goudy" panose="020B0604020202020204" charset="0"/>
       <p:regular r:id="rId7"/>
@@ -30,24 +29,20 @@
       <p:regular r:id="rId9"/>
     </p:embeddedFont>
     <p:embeddedFont>
-      <p:font typeface="Montserrat Italics" panose="020B0604020202020204" charset="0"/>
+      <p:font typeface="Neue Montreal" panose="020B0604020202020204" charset="0"/>
       <p:regular r:id="rId10"/>
     </p:embeddedFont>
     <p:embeddedFont>
-      <p:font typeface="Neue Montreal" panose="020B0604020202020204" charset="0"/>
+      <p:font typeface="Neue Montreal Bold" panose="020B0604020202020204" charset="0"/>
       <p:regular r:id="rId11"/>
     </p:embeddedFont>
     <p:embeddedFont>
-      <p:font typeface="Neue Montreal Bold" panose="020B0604020202020204" charset="0"/>
+      <p:font typeface="Overpass" panose="020B0604020202020204" charset="0"/>
       <p:regular r:id="rId12"/>
     </p:embeddedFont>
     <p:embeddedFont>
-      <p:font typeface="Overpass" panose="020B0604020202020204" charset="0"/>
+      <p:font typeface="Tenor Sans" panose="020B0604020202020204" charset="0"/>
       <p:regular r:id="rId13"/>
-    </p:embeddedFont>
-    <p:embeddedFont>
-      <p:font typeface="Tenor Sans" panose="020B0604020202020204" charset="0"/>
-      <p:regular r:id="rId14"/>
     </p:embeddedFont>
   </p:embeddedFontLst>
   <p:defaultTextStyle>
@@ -164,6 +159,439 @@
 </p:presentation>
 </file>
 
+<file path=ppt/notesMasters/notesMaster1.xml><?xml version="1.0" encoding="utf-8"?>
+<p:notesMaster xmlns:a="http://schemas.openxmlformats.org/drawingml/2006/main" xmlns:r="http://schemas.openxmlformats.org/officeDocument/2006/relationships" xmlns:p="http://schemas.openxmlformats.org/presentationml/2006/main">
+  <p:cSld>
+    <p:bg>
+      <p:bgRef idx="1001">
+        <a:schemeClr val="bg1"/>
+      </p:bgRef>
+    </p:bg>
+    <p:spTree>
+      <p:nvGrpSpPr>
+        <p:cNvPr id="1" name=""/>
+        <p:cNvGrpSpPr/>
+        <p:nvPr/>
+      </p:nvGrpSpPr>
+      <p:grpSpPr>
+        <a:xfrm>
+          <a:off x="0" y="0"/>
+          <a:ext cx="0" cy="0"/>
+          <a:chOff x="0" y="0"/>
+          <a:chExt cx="0" cy="0"/>
+        </a:xfrm>
+      </p:grpSpPr>
+      <p:sp>
+        <p:nvSpPr>
+          <p:cNvPr id="2" name="Segnaposto intestazione 1"/>
+          <p:cNvSpPr>
+            <a:spLocks noGrp="1"/>
+          </p:cNvSpPr>
+          <p:nvPr>
+            <p:ph type="hdr" sz="quarter"/>
+          </p:nvPr>
+        </p:nvSpPr>
+        <p:spPr>
+          <a:xfrm>
+            <a:off x="0" y="0"/>
+            <a:ext cx="2971800" cy="458788"/>
+          </a:xfrm>
+          <a:prstGeom prst="rect">
+            <a:avLst/>
+          </a:prstGeom>
+        </p:spPr>
+        <p:txBody>
+          <a:bodyPr vert="horz" lIns="91440" tIns="45720" rIns="91440" bIns="45720" rtlCol="0"/>
+          <a:lstStyle>
+            <a:lvl1pPr algn="l">
+              <a:defRPr sz="1200"/>
+            </a:lvl1pPr>
+          </a:lstStyle>
+          <a:p>
+            <a:endParaRPr lang="it-IT"/>
+          </a:p>
+        </p:txBody>
+      </p:sp>
+      <p:sp>
+        <p:nvSpPr>
+          <p:cNvPr id="3" name="Segnaposto data 2"/>
+          <p:cNvSpPr>
+            <a:spLocks noGrp="1"/>
+          </p:cNvSpPr>
+          <p:nvPr>
+            <p:ph type="dt" idx="1"/>
+          </p:nvPr>
+        </p:nvSpPr>
+        <p:spPr>
+          <a:xfrm>
+            <a:off x="3884613" y="0"/>
+            <a:ext cx="2971800" cy="458788"/>
+          </a:xfrm>
+          <a:prstGeom prst="rect">
+            <a:avLst/>
+          </a:prstGeom>
+        </p:spPr>
+        <p:txBody>
+          <a:bodyPr vert="horz" lIns="91440" tIns="45720" rIns="91440" bIns="45720" rtlCol="0"/>
+          <a:lstStyle>
+            <a:lvl1pPr algn="r">
+              <a:defRPr sz="1200"/>
+            </a:lvl1pPr>
+          </a:lstStyle>
+          <a:p>
+            <a:fld id="{DC233B30-4F8C-4A4C-AB5E-3B02323E36F5}" type="datetimeFigureOut">
+              <a:rPr lang="it-IT" smtClean="0"/>
+              <a:t>26/10/2025</a:t>
+            </a:fld>
+            <a:endParaRPr lang="it-IT"/>
+          </a:p>
+        </p:txBody>
+      </p:sp>
+      <p:sp>
+        <p:nvSpPr>
+          <p:cNvPr id="4" name="Segnaposto immagine diapositiva 3"/>
+          <p:cNvSpPr>
+            <a:spLocks noGrp="1" noRot="1" noChangeAspect="1"/>
+          </p:cNvSpPr>
+          <p:nvPr>
+            <p:ph type="sldImg" idx="2"/>
+          </p:nvPr>
+        </p:nvSpPr>
+        <p:spPr>
+          <a:xfrm>
+            <a:off x="685800" y="1143000"/>
+            <a:ext cx="5486400" cy="3086100"/>
+          </a:xfrm>
+          <a:prstGeom prst="rect">
+            <a:avLst/>
+          </a:prstGeom>
+          <a:noFill/>
+          <a:ln w="12700">
+            <a:solidFill>
+              <a:prstClr val="black"/>
+            </a:solidFill>
+          </a:ln>
+        </p:spPr>
+        <p:txBody>
+          <a:bodyPr vert="horz" lIns="91440" tIns="45720" rIns="91440" bIns="45720" rtlCol="0" anchor="ctr"/>
+          <a:lstStyle/>
+          <a:p>
+            <a:endParaRPr lang="it-IT"/>
+          </a:p>
+        </p:txBody>
+      </p:sp>
+      <p:sp>
+        <p:nvSpPr>
+          <p:cNvPr id="5" name="Segnaposto note 4"/>
+          <p:cNvSpPr>
+            <a:spLocks noGrp="1"/>
+          </p:cNvSpPr>
+          <p:nvPr>
+            <p:ph type="body" sz="quarter" idx="3"/>
+          </p:nvPr>
+        </p:nvSpPr>
+        <p:spPr>
+          <a:xfrm>
+            <a:off x="685800" y="4400550"/>
+            <a:ext cx="5486400" cy="3600450"/>
+          </a:xfrm>
+          <a:prstGeom prst="rect">
+            <a:avLst/>
+          </a:prstGeom>
+        </p:spPr>
+        <p:txBody>
+          <a:bodyPr vert="horz" lIns="91440" tIns="45720" rIns="91440" bIns="45720" rtlCol="0"/>
+          <a:lstStyle/>
+          <a:p>
+            <a:pPr lvl="0"/>
+            <a:r>
+              <a:rPr lang="it-IT"/>
+              <a:t>Fare clic per modificare gli stili del testo dello schema</a:t>
+            </a:r>
+          </a:p>
+          <a:p>
+            <a:pPr lvl="1"/>
+            <a:r>
+              <a:rPr lang="it-IT"/>
+              <a:t>Secondo livello</a:t>
+            </a:r>
+          </a:p>
+          <a:p>
+            <a:pPr lvl="2"/>
+            <a:r>
+              <a:rPr lang="it-IT"/>
+              <a:t>Terzo livello</a:t>
+            </a:r>
+          </a:p>
+          <a:p>
+            <a:pPr lvl="3"/>
+            <a:r>
+              <a:rPr lang="it-IT"/>
+              <a:t>Quarto livello</a:t>
+            </a:r>
+          </a:p>
+          <a:p>
+            <a:pPr lvl="4"/>
+            <a:r>
+              <a:rPr lang="it-IT"/>
+              <a:t>Quinto livello</a:t>
+            </a:r>
+          </a:p>
+        </p:txBody>
+      </p:sp>
+      <p:sp>
+        <p:nvSpPr>
+          <p:cNvPr id="6" name="Segnaposto piè di pagina 5"/>
+          <p:cNvSpPr>
+            <a:spLocks noGrp="1"/>
+          </p:cNvSpPr>
+          <p:nvPr>
+            <p:ph type="ftr" sz="quarter" idx="4"/>
+          </p:nvPr>
+        </p:nvSpPr>
+        <p:spPr>
+          <a:xfrm>
+            <a:off x="0" y="8685213"/>
+            <a:ext cx="2971800" cy="458787"/>
+          </a:xfrm>
+          <a:prstGeom prst="rect">
+            <a:avLst/>
+          </a:prstGeom>
+        </p:spPr>
+        <p:txBody>
+          <a:bodyPr vert="horz" lIns="91440" tIns="45720" rIns="91440" bIns="45720" rtlCol="0" anchor="b"/>
+          <a:lstStyle>
+            <a:lvl1pPr algn="l">
+              <a:defRPr sz="1200"/>
+            </a:lvl1pPr>
+          </a:lstStyle>
+          <a:p>
+            <a:endParaRPr lang="it-IT"/>
+          </a:p>
+        </p:txBody>
+      </p:sp>
+      <p:sp>
+        <p:nvSpPr>
+          <p:cNvPr id="7" name="Segnaposto numero diapositiva 6"/>
+          <p:cNvSpPr>
+            <a:spLocks noGrp="1"/>
+          </p:cNvSpPr>
+          <p:nvPr>
+            <p:ph type="sldNum" sz="quarter" idx="5"/>
+          </p:nvPr>
+        </p:nvSpPr>
+        <p:spPr>
+          <a:xfrm>
+            <a:off x="3884613" y="8685213"/>
+            <a:ext cx="2971800" cy="458787"/>
+          </a:xfrm>
+          <a:prstGeom prst="rect">
+            <a:avLst/>
+          </a:prstGeom>
+        </p:spPr>
+        <p:txBody>
+          <a:bodyPr vert="horz" lIns="91440" tIns="45720" rIns="91440" bIns="45720" rtlCol="0" anchor="b"/>
+          <a:lstStyle>
+            <a:lvl1pPr algn="r">
+              <a:defRPr sz="1200"/>
+            </a:lvl1pPr>
+          </a:lstStyle>
+          <a:p>
+            <a:fld id="{2C08170C-5CFB-499E-8257-3D18EF4D2E05}" type="slidenum">
+              <a:rPr lang="it-IT" smtClean="0"/>
+              <a:t>‹N›</a:t>
+            </a:fld>
+            <a:endParaRPr lang="it-IT"/>
+          </a:p>
+        </p:txBody>
+      </p:sp>
+    </p:spTree>
+    <p:extLst>
+      <p:ext uri="{BB962C8B-B14F-4D97-AF65-F5344CB8AC3E}">
+        <p14:creationId xmlns:p14="http://schemas.microsoft.com/office/powerpoint/2010/main" val="1725633588"/>
+      </p:ext>
+    </p:extLst>
+  </p:cSld>
+  <p:clrMap bg1="lt1" tx1="dk1" bg2="lt2" tx2="dk2" accent1="accent1" accent2="accent2" accent3="accent3" accent4="accent4" accent5="accent5" accent6="accent6" hlink="hlink" folHlink="folHlink"/>
+  <p:notesStyle>
+    <a:lvl1pPr marL="0" algn="l" defTabSz="914400" rtl="0" eaLnBrk="1" latinLnBrk="0" hangingPunct="1">
+      <a:defRPr sz="1200" kern="1200">
+        <a:solidFill>
+          <a:schemeClr val="tx1"/>
+        </a:solidFill>
+        <a:latin typeface="+mn-lt"/>
+        <a:ea typeface="+mn-ea"/>
+        <a:cs typeface="+mn-cs"/>
+      </a:defRPr>
+    </a:lvl1pPr>
+    <a:lvl2pPr marL="457200" algn="l" defTabSz="914400" rtl="0" eaLnBrk="1" latinLnBrk="0" hangingPunct="1">
+      <a:defRPr sz="1200" kern="1200">
+        <a:solidFill>
+          <a:schemeClr val="tx1"/>
+        </a:solidFill>
+        <a:latin typeface="+mn-lt"/>
+        <a:ea typeface="+mn-ea"/>
+        <a:cs typeface="+mn-cs"/>
+      </a:defRPr>
+    </a:lvl2pPr>
+    <a:lvl3pPr marL="914400" algn="l" defTabSz="914400" rtl="0" eaLnBrk="1" latinLnBrk="0" hangingPunct="1">
+      <a:defRPr sz="1200" kern="1200">
+        <a:solidFill>
+          <a:schemeClr val="tx1"/>
+        </a:solidFill>
+        <a:latin typeface="+mn-lt"/>
+        <a:ea typeface="+mn-ea"/>
+        <a:cs typeface="+mn-cs"/>
+      </a:defRPr>
+    </a:lvl3pPr>
+    <a:lvl4pPr marL="1371600" algn="l" defTabSz="914400" rtl="0" eaLnBrk="1" latinLnBrk="0" hangingPunct="1">
+      <a:defRPr sz="1200" kern="1200">
+        <a:solidFill>
+          <a:schemeClr val="tx1"/>
+        </a:solidFill>
+        <a:latin typeface="+mn-lt"/>
+        <a:ea typeface="+mn-ea"/>
+        <a:cs typeface="+mn-cs"/>
+      </a:defRPr>
+    </a:lvl4pPr>
+    <a:lvl5pPr marL="1828800" algn="l" defTabSz="914400" rtl="0" eaLnBrk="1" latinLnBrk="0" hangingPunct="1">
+      <a:defRPr sz="1200" kern="1200">
+        <a:solidFill>
+          <a:schemeClr val="tx1"/>
+        </a:solidFill>
+        <a:latin typeface="+mn-lt"/>
+        <a:ea typeface="+mn-ea"/>
+        <a:cs typeface="+mn-cs"/>
+      </a:defRPr>
+    </a:lvl5pPr>
+    <a:lvl6pPr marL="2286000" algn="l" defTabSz="914400" rtl="0" eaLnBrk="1" latinLnBrk="0" hangingPunct="1">
+      <a:defRPr sz="1200" kern="1200">
+        <a:solidFill>
+          <a:schemeClr val="tx1"/>
+        </a:solidFill>
+        <a:latin typeface="+mn-lt"/>
+        <a:ea typeface="+mn-ea"/>
+        <a:cs typeface="+mn-cs"/>
+      </a:defRPr>
+    </a:lvl6pPr>
+    <a:lvl7pPr marL="2743200" algn="l" defTabSz="914400" rtl="0" eaLnBrk="1" latinLnBrk="0" hangingPunct="1">
+      <a:defRPr sz="1200" kern="1200">
+        <a:solidFill>
+          <a:schemeClr val="tx1"/>
+        </a:solidFill>
+        <a:latin typeface="+mn-lt"/>
+        <a:ea typeface="+mn-ea"/>
+        <a:cs typeface="+mn-cs"/>
+      </a:defRPr>
+    </a:lvl7pPr>
+    <a:lvl8pPr marL="3200400" algn="l" defTabSz="914400" rtl="0" eaLnBrk="1" latinLnBrk="0" hangingPunct="1">
+      <a:defRPr sz="1200" kern="1200">
+        <a:solidFill>
+          <a:schemeClr val="tx1"/>
+        </a:solidFill>
+        <a:latin typeface="+mn-lt"/>
+        <a:ea typeface="+mn-ea"/>
+        <a:cs typeface="+mn-cs"/>
+      </a:defRPr>
+    </a:lvl8pPr>
+    <a:lvl9pPr marL="3657600" algn="l" defTabSz="914400" rtl="0" eaLnBrk="1" latinLnBrk="0" hangingPunct="1">
+      <a:defRPr sz="1200" kern="1200">
+        <a:solidFill>
+          <a:schemeClr val="tx1"/>
+        </a:solidFill>
+        <a:latin typeface="+mn-lt"/>
+        <a:ea typeface="+mn-ea"/>
+        <a:cs typeface="+mn-cs"/>
+      </a:defRPr>
+    </a:lvl9pPr>
+  </p:notesStyle>
+</p:notesMaster>
+</file>
+
+<file path=ppt/notesSlides/notesSlide1.xml><?xml version="1.0" encoding="utf-8"?>
+<p:notes xmlns:a="http://schemas.openxmlformats.org/drawingml/2006/main" xmlns:r="http://schemas.openxmlformats.org/officeDocument/2006/relationships" xmlns:p="http://schemas.openxmlformats.org/presentationml/2006/main">
+  <p:cSld>
+    <p:spTree>
+      <p:nvGrpSpPr>
+        <p:cNvPr id="1" name=""/>
+        <p:cNvGrpSpPr/>
+        <p:nvPr/>
+      </p:nvGrpSpPr>
+      <p:grpSpPr>
+        <a:xfrm>
+          <a:off x="0" y="0"/>
+          <a:ext cx="0" cy="0"/>
+          <a:chOff x="0" y="0"/>
+          <a:chExt cx="0" cy="0"/>
+        </a:xfrm>
+      </p:grpSpPr>
+      <p:sp>
+        <p:nvSpPr>
+          <p:cNvPr id="2" name="Segnaposto immagine diapositiva 1"/>
+          <p:cNvSpPr>
+            <a:spLocks noGrp="1" noRot="1" noChangeAspect="1"/>
+          </p:cNvSpPr>
+          <p:nvPr>
+            <p:ph type="sldImg"/>
+          </p:nvPr>
+        </p:nvSpPr>
+        <p:spPr/>
+      </p:sp>
+      <p:sp>
+        <p:nvSpPr>
+          <p:cNvPr id="3" name="Segnaposto note 2"/>
+          <p:cNvSpPr>
+            <a:spLocks noGrp="1"/>
+          </p:cNvSpPr>
+          <p:nvPr>
+            <p:ph type="body" idx="1"/>
+          </p:nvPr>
+        </p:nvSpPr>
+        <p:spPr/>
+        <p:txBody>
+          <a:bodyPr/>
+          <a:lstStyle/>
+          <a:p>
+            <a:endParaRPr lang="it-IT" dirty="0"/>
+          </a:p>
+        </p:txBody>
+      </p:sp>
+      <p:sp>
+        <p:nvSpPr>
+          <p:cNvPr id="4" name="Segnaposto numero diapositiva 3"/>
+          <p:cNvSpPr>
+            <a:spLocks noGrp="1"/>
+          </p:cNvSpPr>
+          <p:nvPr>
+            <p:ph type="sldNum" sz="quarter" idx="5"/>
+          </p:nvPr>
+        </p:nvSpPr>
+        <p:spPr/>
+        <p:txBody>
+          <a:bodyPr/>
+          <a:lstStyle/>
+          <a:p>
+            <a:fld id="{2C08170C-5CFB-499E-8257-3D18EF4D2E05}" type="slidenum">
+              <a:rPr lang="it-IT" smtClean="0"/>
+              <a:t>2</a:t>
+            </a:fld>
+            <a:endParaRPr lang="it-IT"/>
+          </a:p>
+        </p:txBody>
+      </p:sp>
+    </p:spTree>
+    <p:extLst>
+      <p:ext uri="{BB962C8B-B14F-4D97-AF65-F5344CB8AC3E}">
+        <p14:creationId xmlns:p14="http://schemas.microsoft.com/office/powerpoint/2010/main" val="4034108747"/>
+      </p:ext>
+    </p:extLst>
+  </p:cSld>
+  <p:clrMapOvr>
+    <a:masterClrMapping/>
+  </p:clrMapOvr>
+</p:notes>
+</file>
+
 <file path=ppt/slideLayouts/slideLayout1.xml><?xml version="1.0" encoding="utf-8"?>
 <p:sldLayout xmlns:a="http://schemas.openxmlformats.org/drawingml/2006/main" xmlns:r="http://schemas.openxmlformats.org/officeDocument/2006/relationships" xmlns:p="http://schemas.openxmlformats.org/presentationml/2006/main" type="title" preserve="1">
   <p:cSld name="Title Slide">
@@ -344,7 +772,7 @@
             <a:fld id="{1D8BD707-D9CF-40AE-B4C6-C98DA3205C09}" type="datetimeFigureOut">
               <a:rPr lang="en-US" smtClean="0"/>
               <a:pPr/>
-              <a:t>10/25/2025</a:t>
+              <a:t>10/26/2025</a:t>
             </a:fld>
             <a:endParaRPr lang="en-US"/>
           </a:p>
@@ -509,7 +937,7 @@
             <a:fld id="{1D8BD707-D9CF-40AE-B4C6-C98DA3205C09}" type="datetimeFigureOut">
               <a:rPr lang="en-US" smtClean="0"/>
               <a:pPr/>
-              <a:t>10/25/2025</a:t>
+              <a:t>10/26/2025</a:t>
             </a:fld>
             <a:endParaRPr lang="en-US"/>
           </a:p>
@@ -684,7 +1112,7 @@
             <a:fld id="{1D8BD707-D9CF-40AE-B4C6-C98DA3205C09}" type="datetimeFigureOut">
               <a:rPr lang="en-US" smtClean="0"/>
               <a:pPr/>
-              <a:t>10/25/2025</a:t>
+              <a:t>10/26/2025</a:t>
             </a:fld>
             <a:endParaRPr lang="en-US"/>
           </a:p>
@@ -849,7 +1277,7 @@
             <a:fld id="{1D8BD707-D9CF-40AE-B4C6-C98DA3205C09}" type="datetimeFigureOut">
               <a:rPr lang="en-US" smtClean="0"/>
               <a:pPr/>
-              <a:t>10/25/2025</a:t>
+              <a:t>10/26/2025</a:t>
             </a:fld>
             <a:endParaRPr lang="en-US"/>
           </a:p>
@@ -1091,7 +1519,7 @@
             <a:fld id="{1D8BD707-D9CF-40AE-B4C6-C98DA3205C09}" type="datetimeFigureOut">
               <a:rPr lang="en-US" smtClean="0"/>
               <a:pPr/>
-              <a:t>10/25/2025</a:t>
+              <a:t>10/26/2025</a:t>
             </a:fld>
             <a:endParaRPr lang="en-US"/>
           </a:p>
@@ -1373,7 +1801,7 @@
             <a:fld id="{1D8BD707-D9CF-40AE-B4C6-C98DA3205C09}" type="datetimeFigureOut">
               <a:rPr lang="en-US" smtClean="0"/>
               <a:pPr/>
-              <a:t>10/25/2025</a:t>
+              <a:t>10/26/2025</a:t>
             </a:fld>
             <a:endParaRPr lang="en-US"/>
           </a:p>
@@ -1789,7 +2217,7 @@
             <a:fld id="{1D8BD707-D9CF-40AE-B4C6-C98DA3205C09}" type="datetimeFigureOut">
               <a:rPr lang="en-US" smtClean="0"/>
               <a:pPr/>
-              <a:t>10/25/2025</a:t>
+              <a:t>10/26/2025</a:t>
             </a:fld>
             <a:endParaRPr lang="en-US"/>
           </a:p>
@@ -1903,7 +2331,7 @@
             <a:fld id="{1D8BD707-D9CF-40AE-B4C6-C98DA3205C09}" type="datetimeFigureOut">
               <a:rPr lang="en-US" smtClean="0"/>
               <a:pPr/>
-              <a:t>10/25/2025</a:t>
+              <a:t>10/26/2025</a:t>
             </a:fld>
             <a:endParaRPr lang="en-US"/>
           </a:p>
@@ -1995,7 +2423,7 @@
             <a:fld id="{1D8BD707-D9CF-40AE-B4C6-C98DA3205C09}" type="datetimeFigureOut">
               <a:rPr lang="en-US" smtClean="0"/>
               <a:pPr/>
-              <a:t>10/25/2025</a:t>
+              <a:t>10/26/2025</a:t>
             </a:fld>
             <a:endParaRPr lang="en-US"/>
           </a:p>
@@ -2267,7 +2695,7 @@
             <a:fld id="{1D8BD707-D9CF-40AE-B4C6-C98DA3205C09}" type="datetimeFigureOut">
               <a:rPr lang="en-US" smtClean="0"/>
               <a:pPr/>
-              <a:t>10/25/2025</a:t>
+              <a:t>10/26/2025</a:t>
             </a:fld>
             <a:endParaRPr lang="en-US"/>
           </a:p>
@@ -2516,7 +2944,7 @@
             <a:fld id="{1D8BD707-D9CF-40AE-B4C6-C98DA3205C09}" type="datetimeFigureOut">
               <a:rPr lang="en-US" smtClean="0"/>
               <a:pPr/>
-              <a:t>10/25/2025</a:t>
+              <a:t>10/26/2025</a:t>
             </a:fld>
             <a:endParaRPr lang="en-US"/>
           </a:p>
@@ -2724,7 +3152,7 @@
             <a:fld id="{1D8BD707-D9CF-40AE-B4C6-C98DA3205C09}" type="datetimeFigureOut">
               <a:rPr lang="en-US" smtClean="0"/>
               <a:pPr/>
-              <a:t>10/25/2025</a:t>
+              <a:t>10/26/2025</a:t>
             </a:fld>
             <a:endParaRPr lang="en-US"/>
           </a:p>
@@ -3160,7 +3588,7 @@
             <a:bodyPr/>
             <a:lstStyle/>
             <a:p>
-              <a:endParaRPr lang="it-IT"/>
+              <a:endParaRPr lang="it-IT" noProof="0" dirty="0"/>
             </a:p>
           </p:txBody>
         </p:sp>
@@ -3189,7 +3617,7 @@
                 </a:lnSpc>
               </a:pPr>
               <a:r>
-                <a:rPr lang="en-US" sz="2999" b="1" dirty="0">
+                <a:rPr lang="it-IT" sz="2999" b="1" noProof="0" dirty="0">
                   <a:solidFill>
                     <a:srgbClr val="000000"/>
                   </a:solidFill>
@@ -3208,7 +3636,7 @@
                 </a:lnSpc>
               </a:pPr>
               <a:r>
-                <a:rPr lang="en-US" sz="2999" b="1" dirty="0" err="1">
+                <a:rPr lang="it-IT" sz="2999" b="1" noProof="0" dirty="0" err="1">
                   <a:solidFill>
                     <a:srgbClr val="000000"/>
                   </a:solidFill>
@@ -3219,7 +3647,7 @@
                 </a:rPr>
                 <a:t>BugBusters</a:t>
               </a:r>
-              <a:endParaRPr lang="en-US" sz="2999" b="1" dirty="0">
+              <a:endParaRPr lang="it-IT" sz="2999" b="1" noProof="0" dirty="0">
                 <a:solidFill>
                   <a:srgbClr val="000000"/>
                 </a:solidFill>
@@ -3301,7 +3729,7 @@
             <a:bodyPr/>
             <a:lstStyle/>
             <a:p>
-              <a:endParaRPr lang="it-IT"/>
+              <a:endParaRPr lang="it-IT" noProof="0" dirty="0"/>
             </a:p>
           </p:txBody>
         </p:sp>
@@ -3329,7 +3757,7 @@
                   <a:spcPts val="3359"/>
                 </a:lnSpc>
               </a:pPr>
-              <a:endParaRPr/>
+              <a:endParaRPr lang="it-IT" noProof="0" dirty="0"/>
             </a:p>
           </p:txBody>
         </p:sp>
@@ -3383,7 +3811,7 @@
           <a:bodyPr/>
           <a:lstStyle/>
           <a:p>
-            <a:endParaRPr lang="it-IT"/>
+            <a:endParaRPr lang="it-IT" noProof="0" dirty="0"/>
           </a:p>
         </p:txBody>
       </p:sp>
@@ -3414,7 +3842,7 @@
               </a:lnSpc>
             </a:pPr>
             <a:r>
-              <a:rPr lang="en-US" sz="15999" spc="-959">
+              <a:rPr lang="it-IT" sz="15999" spc="-959" noProof="0" dirty="0">
                 <a:solidFill>
                   <a:srgbClr val="000000"/>
                 </a:solidFill>
@@ -3455,7 +3883,7 @@
               </a:lnSpc>
             </a:pPr>
             <a:r>
-              <a:rPr lang="en-US" sz="2713">
+              <a:rPr lang="it-IT" sz="2713" noProof="0" dirty="0">
                 <a:solidFill>
                   <a:srgbClr val="000000"/>
                 </a:solidFill>
@@ -3496,7 +3924,7 @@
               </a:lnSpc>
             </a:pPr>
             <a:r>
-              <a:rPr lang="en-US" sz="2300" b="1">
+              <a:rPr lang="it-IT" sz="2300" b="1" noProof="0" dirty="0">
                 <a:solidFill>
                   <a:srgbClr val="000000"/>
                 </a:solidFill>
@@ -3508,7 +3936,7 @@
               <a:t>Team:</a:t>
             </a:r>
             <a:r>
-              <a:rPr lang="en-US" sz="2300">
+              <a:rPr lang="it-IT" sz="2300" noProof="0" dirty="0">
                 <a:solidFill>
                   <a:srgbClr val="000000"/>
                 </a:solidFill>
@@ -3517,7 +3945,55 @@
                 <a:cs typeface="Neue Montreal"/>
                 <a:sym typeface="Neue Montreal"/>
               </a:rPr>
-              <a:t> Alberto Autiero, Marco Favero, Alberto Pignat, Marco Piro, Linor Sadè, Leonardo Salviato, Luca Slongo</a:t>
+              <a:t> Alberto Autiero, Marco Favero, Alberto Pignat, Marco Piro, </a:t>
+            </a:r>
+            <a:r>
+              <a:rPr lang="it-IT" sz="2300" noProof="0" dirty="0" err="1">
+                <a:solidFill>
+                  <a:srgbClr val="000000"/>
+                </a:solidFill>
+                <a:latin typeface="Neue Montreal"/>
+                <a:ea typeface="Neue Montreal"/>
+                <a:cs typeface="Neue Montreal"/>
+                <a:sym typeface="Neue Montreal"/>
+              </a:rPr>
+              <a:t>Linor</a:t>
+            </a:r>
+            <a:r>
+              <a:rPr lang="it-IT" sz="2300" noProof="0" dirty="0">
+                <a:solidFill>
+                  <a:srgbClr val="000000"/>
+                </a:solidFill>
+                <a:latin typeface="Neue Montreal"/>
+                <a:ea typeface="Neue Montreal"/>
+                <a:cs typeface="Neue Montreal"/>
+                <a:sym typeface="Neue Montreal"/>
+              </a:rPr>
+              <a:t> </a:t>
+            </a:r>
+            <a:r>
+              <a:rPr lang="it-IT" sz="2300" noProof="0" dirty="0" err="1">
+                <a:solidFill>
+                  <a:srgbClr val="000000"/>
+                </a:solidFill>
+                <a:latin typeface="Neue Montreal"/>
+                <a:ea typeface="Neue Montreal"/>
+                <a:cs typeface="Neue Montreal"/>
+                <a:sym typeface="Neue Montreal"/>
+              </a:rPr>
+              <a:t>Sadè</a:t>
+            </a:r>
+            <a:r>
+              <a:rPr lang="it-IT" sz="2300" noProof="0" dirty="0">
+                <a:solidFill>
+                  <a:srgbClr val="000000"/>
+                </a:solidFill>
+                <a:latin typeface="Neue Montreal"/>
+                <a:ea typeface="Neue Montreal"/>
+                <a:cs typeface="Neue Montreal"/>
+                <a:sym typeface="Neue Montreal"/>
+              </a:rPr>
+              <a:t>, Leonardo Salviato, Luca Slongo</a:t>
             </a:r>
           </a:p>
           <a:p>
@@ -3527,7 +4003,7 @@
               </a:lnSpc>
             </a:pPr>
             <a:r>
-              <a:rPr lang="en-US" sz="2300" b="1">
+              <a:rPr lang="it-IT" sz="2300" b="1" noProof="0" dirty="0">
                 <a:solidFill>
                   <a:srgbClr val="000000"/>
                 </a:solidFill>
@@ -3539,7 +4015,7 @@
               <a:t>Docente: </a:t>
             </a:r>
             <a:r>
-              <a:rPr lang="en-US" sz="2300">
+              <a:rPr lang="it-IT" sz="2300" noProof="0" dirty="0">
                 <a:solidFill>
                   <a:srgbClr val="000000"/>
                 </a:solidFill>
@@ -3631,7 +4107,7 @@
           <p:nvPr/>
         </p:nvPicPr>
         <p:blipFill>
-          <a:blip r:embed="rId2"/>
+          <a:blip r:embed="rId3"/>
           <a:srcRect l="62989" t="67035"/>
           <a:stretch>
             <a:fillRect/>
@@ -3656,7 +4132,7 @@
           <p:nvPr/>
         </p:nvPicPr>
         <p:blipFill>
-          <a:blip r:embed="rId3"/>
+          <a:blip r:embed="rId4"/>
           <a:srcRect r="64034" b="46739"/>
           <a:stretch>
             <a:fillRect/>
@@ -3664,8 +4140,8 @@
         </p:blipFill>
         <p:spPr>
           <a:xfrm rot="-5400000" flipH="1">
-            <a:off x="1041561" y="-1041561"/>
-            <a:ext cx="4331879" cy="6415001"/>
+            <a:off x="796991" y="-796988"/>
+            <a:ext cx="3314701" cy="4908680"/>
           </a:xfrm>
           <a:prstGeom prst="rect">
             <a:avLst/>
@@ -3681,9 +4157,9 @@
         <p:grpSpPr>
           <a:xfrm>
             <a:off x="360731" y="208677"/>
-            <a:ext cx="17566537" cy="9899725"/>
+            <a:ext cx="17566537" cy="9167958"/>
             <a:chOff x="0" y="471724"/>
-            <a:chExt cx="23422050" cy="13199631"/>
+            <a:chExt cx="23422050" cy="12223941"/>
           </a:xfrm>
         </p:grpSpPr>
         <p:sp>
@@ -3694,511 +4170,121 @@
           </p:nvSpPr>
           <p:spPr>
             <a:xfrm>
-              <a:off x="0" y="2760250"/>
-              <a:ext cx="21879144" cy="10911105"/>
+              <a:off x="0" y="3571631"/>
+              <a:ext cx="11609426" cy="9124034"/>
             </a:xfrm>
             <a:prstGeom prst="rect">
               <a:avLst/>
             </a:prstGeom>
           </p:spPr>
           <p:txBody>
-            <a:bodyPr lIns="0" tIns="0" rIns="0" bIns="0" rtlCol="0" anchor="t">
+            <a:bodyPr wrap="square" lIns="0" tIns="0" rIns="0" bIns="0" rtlCol="0" anchor="t">
               <a:spAutoFit/>
             </a:bodyPr>
             <a:lstStyle/>
             <a:p>
-              <a:pPr marL="489056" lvl="1" indent="-244528" algn="l">
+              <a:pPr marL="587428" lvl="1" indent="-342900" algn="l">
                 <a:lnSpc>
                   <a:spcPct val="150000"/>
                 </a:lnSpc>
-                <a:buFont typeface="Arial"/>
-                <a:buChar char="•"/>
+                <a:buFont typeface="Wingdings" panose="05000000000000000000" pitchFamily="2" charset="2"/>
+                <a:buChar char="Ø"/>
               </a:pPr>
               <a:r>
-                <a:rPr lang="en-US" sz="2100" dirty="0" err="1">
+                <a:rPr lang="it-IT" sz="3000" noProof="0" dirty="0">
                   <a:solidFill>
                     <a:srgbClr val="000000"/>
                   </a:solidFill>
                   <a:latin typeface="Overpass"/>
                   <a:ea typeface="Overpass"/>
-                  <a:cs typeface="Overpass"/>
+                  <a:cs typeface="Arial" panose="020B0604020202020204" pitchFamily="34" charset="0"/>
                   <a:sym typeface="Overpass"/>
                 </a:rPr>
-                <a:t>Scelto</a:t>
+                <a:t>Scelto il nome del gruppo</a:t>
               </a:r>
+            </a:p>
+            <a:p>
+              <a:pPr marL="587428" lvl="1" indent="-342900" algn="l">
+                <a:lnSpc>
+                  <a:spcPct val="150000"/>
+                </a:lnSpc>
+                <a:buFont typeface="Wingdings" panose="05000000000000000000" pitchFamily="2" charset="2"/>
+                <a:buChar char="Ø"/>
+              </a:pPr>
               <a:r>
-                <a:rPr lang="en-US" sz="2100" dirty="0">
+                <a:rPr lang="it-IT" sz="3000" noProof="0" dirty="0">
                   <a:solidFill>
                     <a:srgbClr val="000000"/>
                   </a:solidFill>
                   <a:latin typeface="Overpass"/>
                   <a:ea typeface="Overpass"/>
-                  <a:cs typeface="Overpass"/>
+                  <a:cs typeface="Arial" panose="020B0604020202020204" pitchFamily="34" charset="0"/>
                   <a:sym typeface="Overpass"/>
                 </a:rPr>
-                <a:t> il </a:t>
+                <a:t>Creato il logo e l’email del gruppo</a:t>
               </a:r>
+            </a:p>
+            <a:p>
+              <a:pPr marL="587428" lvl="1" indent="-342900" algn="l">
+                <a:lnSpc>
+                  <a:spcPct val="150000"/>
+                </a:lnSpc>
+                <a:buFont typeface="Wingdings" panose="05000000000000000000" pitchFamily="2" charset="2"/>
+                <a:buChar char="Ø"/>
+              </a:pPr>
               <a:r>
-                <a:rPr lang="en-US" sz="2100" dirty="0" err="1">
+                <a:rPr lang="it-IT" sz="3000" noProof="0" dirty="0">
                   <a:solidFill>
                     <a:srgbClr val="000000"/>
                   </a:solidFill>
                   <a:latin typeface="Overpass"/>
                   <a:ea typeface="Overpass"/>
-                  <a:cs typeface="Overpass"/>
+                  <a:cs typeface="Arial" panose="020B0604020202020204" pitchFamily="34" charset="0"/>
                   <a:sym typeface="Overpass"/>
                 </a:rPr>
-                <a:t>nome</a:t>
+                <a:t>Definite le tecnologie da usare</a:t>
               </a:r>
+            </a:p>
+            <a:p>
+              <a:pPr marL="587428" lvl="1" indent="-342900" algn="l">
+                <a:lnSpc>
+                  <a:spcPct val="150000"/>
+                </a:lnSpc>
+                <a:buFont typeface="Wingdings" panose="05000000000000000000" pitchFamily="2" charset="2"/>
+                <a:buChar char="Ø"/>
+              </a:pPr>
               <a:r>
-                <a:rPr lang="en-US" sz="2100" dirty="0">
+                <a:rPr lang="it-IT" sz="3000" noProof="0" dirty="0">
                   <a:solidFill>
                     <a:srgbClr val="000000"/>
                   </a:solidFill>
                   <a:latin typeface="Overpass"/>
                   <a:ea typeface="Overpass"/>
-                  <a:cs typeface="Overpass"/>
+                  <a:cs typeface="Arial" panose="020B0604020202020204" pitchFamily="34" charset="0"/>
                   <a:sym typeface="Overpass"/>
                 </a:rPr>
-                <a:t> del </a:t>
+                <a:t>Valutati tutti i capitolati disponibili</a:t>
               </a:r>
+            </a:p>
+            <a:p>
+              <a:pPr marL="587428" lvl="1" indent="-342900" algn="l">
+                <a:lnSpc>
+                  <a:spcPct val="150000"/>
+                </a:lnSpc>
+                <a:buFont typeface="Wingdings" panose="05000000000000000000" pitchFamily="2" charset="2"/>
+                <a:buChar char="Ø"/>
+              </a:pPr>
               <a:r>
-                <a:rPr lang="en-US" sz="2100" dirty="0" err="1">
+                <a:rPr lang="it-IT" sz="3000" noProof="0" dirty="0">
                   <a:solidFill>
                     <a:srgbClr val="000000"/>
                   </a:solidFill>
                   <a:latin typeface="Overpass"/>
                   <a:ea typeface="Overpass"/>
-                  <a:cs typeface="Overpass"/>
+                  <a:cs typeface="Arial" panose="020B0604020202020204" pitchFamily="34" charset="0"/>
                   <a:sym typeface="Overpass"/>
                 </a:rPr>
-                <a:t>gruppo</a:t>
-              </a:r>
-              <a:endParaRPr lang="en-US" sz="2100" dirty="0">
-                <a:solidFill>
-                  <a:srgbClr val="000000"/>
-                </a:solidFill>
-                <a:latin typeface="Overpass"/>
-                <a:ea typeface="Overpass"/>
-                <a:cs typeface="Overpass"/>
-                <a:sym typeface="Overpass"/>
-              </a:endParaRPr>
-            </a:p>
-            <a:p>
-              <a:pPr marL="489056" lvl="1" indent="-244528" algn="l">
-                <a:lnSpc>
-                  <a:spcPct val="150000"/>
-                </a:lnSpc>
-                <a:buFont typeface="Arial"/>
-                <a:buChar char="•"/>
-              </a:pPr>
-              <a:r>
-                <a:rPr lang="en-US" sz="2100" dirty="0" err="1">
-                  <a:solidFill>
-                    <a:srgbClr val="000000"/>
-                  </a:solidFill>
-                  <a:latin typeface="Overpass"/>
-                  <a:ea typeface="Overpass"/>
-                  <a:cs typeface="Overpass"/>
-                  <a:sym typeface="Overpass"/>
-                </a:rPr>
-                <a:t>Creato</a:t>
-              </a:r>
-              <a:r>
-                <a:rPr lang="en-US" sz="2100" dirty="0">
-                  <a:solidFill>
-                    <a:srgbClr val="000000"/>
-                  </a:solidFill>
-                  <a:latin typeface="Overpass"/>
-                  <a:ea typeface="Overpass"/>
-                  <a:cs typeface="Overpass"/>
-                  <a:sym typeface="Overpass"/>
-                </a:rPr>
-                <a:t> il logo e </a:t>
-              </a:r>
-              <a:r>
-                <a:rPr lang="en-US" sz="2100" dirty="0" err="1">
-                  <a:solidFill>
-                    <a:srgbClr val="000000"/>
-                  </a:solidFill>
-                  <a:latin typeface="Overpass"/>
-                  <a:ea typeface="Overpass"/>
-                  <a:cs typeface="Overpass"/>
-                  <a:sym typeface="Overpass"/>
-                </a:rPr>
-                <a:t>l’email</a:t>
-              </a:r>
-              <a:r>
-                <a:rPr lang="en-US" sz="2100" dirty="0">
-                  <a:solidFill>
-                    <a:srgbClr val="000000"/>
-                  </a:solidFill>
-                  <a:latin typeface="Overpass"/>
-                  <a:ea typeface="Overpass"/>
-                  <a:cs typeface="Overpass"/>
-                  <a:sym typeface="Overpass"/>
-                </a:rPr>
-                <a:t> del </a:t>
-              </a:r>
-              <a:r>
-                <a:rPr lang="en-US" sz="2100" dirty="0" err="1">
-                  <a:solidFill>
-                    <a:srgbClr val="000000"/>
-                  </a:solidFill>
-                  <a:latin typeface="Overpass"/>
-                  <a:ea typeface="Overpass"/>
-                  <a:cs typeface="Overpass"/>
-                  <a:sym typeface="Overpass"/>
-                </a:rPr>
-                <a:t>gruppo</a:t>
-              </a:r>
-              <a:endParaRPr lang="en-US" sz="2100" dirty="0">
-                <a:solidFill>
-                  <a:srgbClr val="000000"/>
-                </a:solidFill>
-                <a:latin typeface="Overpass"/>
-                <a:ea typeface="Overpass"/>
-                <a:cs typeface="Overpass"/>
-                <a:sym typeface="Overpass"/>
-              </a:endParaRPr>
-            </a:p>
-            <a:p>
-              <a:pPr marL="489056" lvl="1" indent="-244528" algn="l">
-                <a:lnSpc>
-                  <a:spcPct val="150000"/>
-                </a:lnSpc>
-                <a:buFont typeface="Arial"/>
-                <a:buChar char="•"/>
-              </a:pPr>
-              <a:r>
-                <a:rPr lang="en-US" sz="2100" dirty="0">
-                  <a:solidFill>
-                    <a:srgbClr val="000000"/>
-                  </a:solidFill>
-                  <a:latin typeface="Overpass"/>
-                  <a:ea typeface="Overpass"/>
-                  <a:cs typeface="Overpass"/>
-                  <a:sym typeface="Overpass"/>
-                </a:rPr>
-                <a:t>Definite le </a:t>
-              </a:r>
-              <a:r>
-                <a:rPr lang="en-US" sz="2100" dirty="0" err="1">
-                  <a:solidFill>
-                    <a:srgbClr val="000000"/>
-                  </a:solidFill>
-                  <a:latin typeface="Overpass"/>
-                  <a:ea typeface="Overpass"/>
-                  <a:cs typeface="Overpass"/>
-                  <a:sym typeface="Overpass"/>
-                </a:rPr>
-                <a:t>tecnologie</a:t>
-              </a:r>
-              <a:r>
-                <a:rPr lang="en-US" sz="2100" dirty="0">
-                  <a:solidFill>
-                    <a:srgbClr val="000000"/>
-                  </a:solidFill>
-                  <a:latin typeface="Overpass"/>
-                  <a:ea typeface="Overpass"/>
-                  <a:cs typeface="Overpass"/>
-                  <a:sym typeface="Overpass"/>
-                </a:rPr>
-                <a:t> da </a:t>
-              </a:r>
-              <a:r>
-                <a:rPr lang="en-US" sz="2100" dirty="0" err="1">
-                  <a:solidFill>
-                    <a:srgbClr val="000000"/>
-                  </a:solidFill>
-                  <a:latin typeface="Overpass"/>
-                  <a:ea typeface="Overpass"/>
-                  <a:cs typeface="Overpass"/>
-                  <a:sym typeface="Overpass"/>
-                </a:rPr>
-                <a:t>usare</a:t>
-              </a:r>
-              <a:endParaRPr lang="en-US" sz="2100" dirty="0">
-                <a:solidFill>
-                  <a:srgbClr val="000000"/>
-                </a:solidFill>
-                <a:latin typeface="Overpass"/>
-                <a:ea typeface="Overpass"/>
-                <a:cs typeface="Overpass"/>
-                <a:sym typeface="Overpass"/>
-              </a:endParaRPr>
-            </a:p>
-            <a:p>
-              <a:pPr marL="489056" lvl="1" indent="-244528" algn="l">
-                <a:lnSpc>
-                  <a:spcPct val="150000"/>
-                </a:lnSpc>
-                <a:buFont typeface="Arial"/>
-                <a:buChar char="•"/>
-              </a:pPr>
-              <a:r>
-                <a:rPr lang="en-US" sz="2100" dirty="0" err="1">
-                  <a:solidFill>
-                    <a:srgbClr val="000000"/>
-                  </a:solidFill>
-                  <a:latin typeface="Overpass"/>
-                  <a:ea typeface="Overpass"/>
-                  <a:cs typeface="Overpass"/>
-                  <a:sym typeface="Overpass"/>
-                </a:rPr>
-                <a:t>Valutati</a:t>
-              </a:r>
-              <a:r>
-                <a:rPr lang="en-US" sz="2100" dirty="0">
-                  <a:solidFill>
-                    <a:srgbClr val="000000"/>
-                  </a:solidFill>
-                  <a:latin typeface="Overpass"/>
-                  <a:ea typeface="Overpass"/>
-                  <a:cs typeface="Overpass"/>
-                  <a:sym typeface="Overpass"/>
-                </a:rPr>
-                <a:t> tutti </a:t>
-              </a:r>
-              <a:r>
-                <a:rPr lang="en-US" sz="2100" dirty="0" err="1">
-                  <a:solidFill>
-                    <a:srgbClr val="000000"/>
-                  </a:solidFill>
-                  <a:latin typeface="Overpass"/>
-                  <a:ea typeface="Overpass"/>
-                  <a:cs typeface="Overpass"/>
-                  <a:sym typeface="Overpass"/>
-                </a:rPr>
-                <a:t>i</a:t>
-              </a:r>
-              <a:r>
-                <a:rPr lang="en-US" sz="2100" dirty="0">
-                  <a:solidFill>
-                    <a:srgbClr val="000000"/>
-                  </a:solidFill>
-                  <a:latin typeface="Overpass"/>
-                  <a:ea typeface="Overpass"/>
-                  <a:cs typeface="Overpass"/>
-                  <a:sym typeface="Overpass"/>
-                </a:rPr>
-                <a:t> </a:t>
-              </a:r>
-              <a:r>
-                <a:rPr lang="en-US" sz="2100" dirty="0" err="1">
-                  <a:solidFill>
-                    <a:srgbClr val="000000"/>
-                  </a:solidFill>
-                  <a:latin typeface="Overpass"/>
-                  <a:ea typeface="Overpass"/>
-                  <a:cs typeface="Overpass"/>
-                  <a:sym typeface="Overpass"/>
-                </a:rPr>
-                <a:t>capitolati</a:t>
-              </a:r>
-              <a:r>
-                <a:rPr lang="en-US" sz="2100" dirty="0">
-                  <a:solidFill>
-                    <a:srgbClr val="000000"/>
-                  </a:solidFill>
-                  <a:latin typeface="Overpass"/>
-                  <a:ea typeface="Overpass"/>
-                  <a:cs typeface="Overpass"/>
-                  <a:sym typeface="Overpass"/>
-                </a:rPr>
-                <a:t> </a:t>
-              </a:r>
-              <a:r>
-                <a:rPr lang="en-US" sz="2100" dirty="0" err="1">
-                  <a:solidFill>
-                    <a:srgbClr val="000000"/>
-                  </a:solidFill>
-                  <a:latin typeface="Overpass"/>
-                  <a:ea typeface="Overpass"/>
-                  <a:cs typeface="Overpass"/>
-                  <a:sym typeface="Overpass"/>
-                </a:rPr>
-                <a:t>disponibili</a:t>
-              </a:r>
-              <a:endParaRPr lang="en-US" sz="2100" dirty="0">
-                <a:solidFill>
-                  <a:srgbClr val="000000"/>
-                </a:solidFill>
-                <a:latin typeface="Overpass"/>
-                <a:ea typeface="Overpass"/>
-                <a:cs typeface="Overpass"/>
-                <a:sym typeface="Overpass"/>
-              </a:endParaRPr>
-            </a:p>
-            <a:p>
-              <a:pPr marL="489056" lvl="1" indent="-244528" algn="l">
-                <a:lnSpc>
-                  <a:spcPct val="150000"/>
-                </a:lnSpc>
-                <a:buFont typeface="Arial"/>
-                <a:buChar char="•"/>
-              </a:pPr>
-              <a:r>
-                <a:rPr lang="en-US" sz="2100" dirty="0" err="1">
-                  <a:solidFill>
-                    <a:srgbClr val="000000"/>
-                  </a:solidFill>
-                  <a:latin typeface="Overpass"/>
-                  <a:ea typeface="Overpass"/>
-                  <a:cs typeface="Overpass"/>
-                  <a:sym typeface="Overpass"/>
-                </a:rPr>
-                <a:t>Inviate</a:t>
-              </a:r>
-              <a:r>
-                <a:rPr lang="en-US" sz="2100" dirty="0">
-                  <a:solidFill>
-                    <a:srgbClr val="000000"/>
-                  </a:solidFill>
-                  <a:latin typeface="Overpass"/>
-                  <a:ea typeface="Overpass"/>
-                  <a:cs typeface="Overpass"/>
-                  <a:sym typeface="Overpass"/>
-                </a:rPr>
-                <a:t> email e </a:t>
-              </a:r>
-              <a:r>
-                <a:rPr lang="en-US" sz="2100" dirty="0" err="1">
-                  <a:solidFill>
-                    <a:srgbClr val="000000"/>
-                  </a:solidFill>
-                  <a:latin typeface="Overpass"/>
-                  <a:ea typeface="Overpass"/>
-                  <a:cs typeface="Overpass"/>
-                  <a:sym typeface="Overpass"/>
-                </a:rPr>
-                <a:t>avuto</a:t>
-              </a:r>
-              <a:r>
-                <a:rPr lang="en-US" sz="2100">
-                  <a:solidFill>
-                    <a:srgbClr val="000000"/>
-                  </a:solidFill>
-                  <a:latin typeface="Overpass"/>
-                  <a:ea typeface="Overpass"/>
-                  <a:cs typeface="Overpass"/>
-                  <a:sym typeface="Overpass"/>
-                </a:rPr>
-                <a:t> incontri</a:t>
-              </a:r>
-              <a:r>
-                <a:rPr lang="en-US" sz="2100" dirty="0">
-                  <a:solidFill>
-                    <a:srgbClr val="000000"/>
-                  </a:solidFill>
-                  <a:latin typeface="Overpass"/>
-                  <a:ea typeface="Overpass"/>
-                  <a:cs typeface="Overpass"/>
-                  <a:sym typeface="Overpass"/>
-                </a:rPr>
-                <a:t> con </a:t>
-              </a:r>
-              <a:r>
-                <a:rPr lang="en-US" sz="2100" dirty="0" err="1">
-                  <a:solidFill>
-                    <a:srgbClr val="000000"/>
-                  </a:solidFill>
-                  <a:latin typeface="Overpass"/>
-                  <a:ea typeface="Overpass"/>
-                  <a:cs typeface="Overpass"/>
-                  <a:sym typeface="Overpass"/>
-                </a:rPr>
-                <a:t>con</a:t>
-              </a:r>
-              <a:r>
-                <a:rPr lang="en-US" sz="2100" dirty="0">
-                  <a:solidFill>
-                    <a:srgbClr val="000000"/>
-                  </a:solidFill>
-                  <a:latin typeface="Overpass"/>
-                  <a:ea typeface="Overpass"/>
-                  <a:cs typeface="Overpass"/>
-                  <a:sym typeface="Overpass"/>
-                </a:rPr>
-                <a:t> le </a:t>
-              </a:r>
-              <a:r>
-                <a:rPr lang="en-US" sz="2100" dirty="0" err="1">
-                  <a:solidFill>
-                    <a:srgbClr val="000000"/>
-                  </a:solidFill>
-                  <a:latin typeface="Overpass"/>
-                  <a:ea typeface="Overpass"/>
-                  <a:cs typeface="Overpass"/>
-                  <a:sym typeface="Overpass"/>
-                </a:rPr>
-                <a:t>seguenti</a:t>
-              </a:r>
-              <a:r>
-                <a:rPr lang="en-US" sz="2100" dirty="0">
-                  <a:solidFill>
-                    <a:srgbClr val="000000"/>
-                  </a:solidFill>
-                  <a:latin typeface="Overpass"/>
-                  <a:ea typeface="Overpass"/>
-                  <a:cs typeface="Overpass"/>
-                  <a:sym typeface="Overpass"/>
-                </a:rPr>
-                <a:t> </a:t>
-              </a:r>
-              <a:r>
-                <a:rPr lang="en-US" sz="2100" dirty="0" err="1">
-                  <a:solidFill>
-                    <a:srgbClr val="000000"/>
-                  </a:solidFill>
-                  <a:latin typeface="Overpass"/>
-                  <a:ea typeface="Overpass"/>
-                  <a:cs typeface="Overpass"/>
-                  <a:sym typeface="Overpass"/>
-                </a:rPr>
-                <a:t>Aziende</a:t>
-              </a:r>
-              <a:endParaRPr lang="en-US" sz="2100" dirty="0">
-                <a:solidFill>
-                  <a:srgbClr val="000000"/>
-                </a:solidFill>
-                <a:latin typeface="Overpass"/>
-                <a:ea typeface="Overpass"/>
-                <a:cs typeface="Overpass"/>
-                <a:sym typeface="Overpass"/>
-              </a:endParaRPr>
-            </a:p>
-            <a:p>
-              <a:pPr marL="1250950" lvl="1" indent="-528638" algn="just">
-                <a:lnSpc>
-                  <a:spcPct val="150000"/>
-                </a:lnSpc>
-                <a:buFont typeface="Wingdings" panose="05000000000000000000" pitchFamily="2" charset="2"/>
-                <a:buChar char="v"/>
-              </a:pPr>
-              <a:r>
-                <a:rPr lang="en-US" sz="2100" dirty="0" err="1">
-                  <a:solidFill>
-                    <a:srgbClr val="000000"/>
-                  </a:solidFill>
-                  <a:latin typeface="Overpass"/>
-                  <a:ea typeface="Overpass"/>
-                  <a:cs typeface="Overpass"/>
-                  <a:sym typeface="Overpass"/>
-                </a:rPr>
-                <a:t>Zucchetti</a:t>
-              </a:r>
-              <a:r>
-                <a:rPr lang="en-US" sz="2100" dirty="0">
-                  <a:solidFill>
-                    <a:srgbClr val="000000"/>
-                  </a:solidFill>
-                  <a:latin typeface="Overpass"/>
-                  <a:ea typeface="Overpass"/>
-                  <a:cs typeface="Overpass"/>
-                  <a:sym typeface="Overpass"/>
-                </a:rPr>
-                <a:t> S.P.A</a:t>
+                <a:t>Inviate email e avuto incontri con le aziende:</a:t>
               </a:r>
             </a:p>
             <a:p>
@@ -4206,47 +4292,62 @@
                 <a:lnSpc>
                   <a:spcPct val="150000"/>
                 </a:lnSpc>
+                <a:buSzPct val="100000"/>
                 <a:buFont typeface="Wingdings" panose="05000000000000000000" pitchFamily="2" charset="2"/>
                 <a:buChar char="v"/>
               </a:pPr>
               <a:r>
-                <a:rPr lang="en-US" sz="2100" dirty="0" err="1">
+                <a:rPr lang="it-IT" sz="3000" noProof="0" dirty="0">
                   <a:solidFill>
                     <a:srgbClr val="000000"/>
                   </a:solidFill>
                   <a:latin typeface="Overpass"/>
                   <a:ea typeface="Overpass"/>
-                  <a:cs typeface="Overpass"/>
+                  <a:cs typeface="Arial" panose="020B0604020202020204" pitchFamily="34" charset="0"/>
                   <a:sym typeface="Overpass"/>
                 </a:rPr>
-                <a:t>Miriade</a:t>
+                <a:t>Zucchetti S.P.A</a:t>
               </a:r>
-              <a:endParaRPr lang="en-US" sz="2100" dirty="0">
-                <a:solidFill>
-                  <a:srgbClr val="000000"/>
-                </a:solidFill>
-                <a:latin typeface="Overpass"/>
-                <a:ea typeface="Overpass"/>
-                <a:cs typeface="Overpass"/>
-                <a:sym typeface="Overpass"/>
-              </a:endParaRPr>
             </a:p>
             <a:p>
               <a:pPr marL="1250950" lvl="1" indent="-528638" algn="just">
                 <a:lnSpc>
                   <a:spcPct val="150000"/>
                 </a:lnSpc>
+                <a:buSzPct val="100000"/>
                 <a:buFont typeface="Wingdings" panose="05000000000000000000" pitchFamily="2" charset="2"/>
                 <a:buChar char="v"/>
               </a:pPr>
               <a:r>
-                <a:rPr lang="en-US" sz="2100" dirty="0">
+                <a:rPr lang="it-IT" sz="3000" noProof="0" dirty="0">
                   <a:solidFill>
                     <a:srgbClr val="000000"/>
                   </a:solidFill>
                   <a:latin typeface="Overpass"/>
                   <a:ea typeface="Overpass"/>
-                  <a:cs typeface="Overpass"/>
+                  <a:cs typeface="Arial" panose="020B0604020202020204" pitchFamily="34" charset="0"/>
+                  <a:sym typeface="Overpass"/>
+                </a:rPr>
+                <a:t>Miriade</a:t>
+              </a:r>
+            </a:p>
+            <a:p>
+              <a:pPr marL="1250950" lvl="1" indent="-528638" algn="just">
+                <a:lnSpc>
+                  <a:spcPct val="150000"/>
+                </a:lnSpc>
+                <a:buSzPct val="100000"/>
+                <a:buFont typeface="Wingdings" panose="05000000000000000000" pitchFamily="2" charset="2"/>
+                <a:buChar char="v"/>
+              </a:pPr>
+              <a:r>
+                <a:rPr lang="it-IT" sz="3000" noProof="0" dirty="0">
+                  <a:solidFill>
+                    <a:srgbClr val="000000"/>
+                  </a:solidFill>
+                  <a:latin typeface="Overpass"/>
+                  <a:ea typeface="Overpass"/>
+                  <a:cs typeface="Arial" panose="020B0604020202020204" pitchFamily="34" charset="0"/>
                   <a:sym typeface="Overpass"/>
                 </a:rPr>
                 <a:t>M31</a:t>
@@ -4257,28 +4358,29 @@
                 <a:lnSpc>
                   <a:spcPct val="150000"/>
                 </a:lnSpc>
+                <a:buSzPct val="100000"/>
                 <a:buFont typeface="Wingdings" panose="05000000000000000000" pitchFamily="2" charset="2"/>
                 <a:buChar char="v"/>
               </a:pPr>
               <a:r>
-                <a:rPr lang="en-US" sz="2100" dirty="0" err="1">
+                <a:rPr lang="it-IT" sz="3000" noProof="0" dirty="0" err="1">
                   <a:solidFill>
                     <a:srgbClr val="000000"/>
                   </a:solidFill>
                   <a:latin typeface="Overpass"/>
                   <a:ea typeface="Overpass"/>
-                  <a:cs typeface="Overpass"/>
+                  <a:cs typeface="Arial" panose="020B0604020202020204" pitchFamily="34" charset="0"/>
                   <a:sym typeface="Overpass"/>
                 </a:rPr>
                 <a:t>Eggon</a:t>
               </a:r>
-              <a:endParaRPr lang="en-US" sz="2100" dirty="0">
+              <a:endParaRPr lang="it-IT" sz="3000" noProof="0" dirty="0">
                 <a:solidFill>
                   <a:srgbClr val="000000"/>
                 </a:solidFill>
                 <a:latin typeface="Overpass"/>
                 <a:ea typeface="Overpass"/>
-                <a:cs typeface="Overpass"/>
+                <a:cs typeface="Arial" panose="020B0604020202020204" pitchFamily="34" charset="0"/>
                 <a:sym typeface="Overpass"/>
               </a:endParaRPr>
             </a:p>
@@ -4287,561 +4389,22 @@
                 <a:lnSpc>
                   <a:spcPct val="150000"/>
                 </a:lnSpc>
+                <a:buSzPct val="100000"/>
                 <a:buFont typeface="Wingdings" panose="05000000000000000000" pitchFamily="2" charset="2"/>
                 <a:buChar char="v"/>
               </a:pPr>
               <a:r>
-                <a:rPr lang="en-US" sz="2100" dirty="0" err="1">
+                <a:rPr lang="it-IT" sz="3000" noProof="0" dirty="0">
                   <a:solidFill>
                     <a:srgbClr val="000000"/>
                   </a:solidFill>
                   <a:latin typeface="Overpass"/>
                   <a:ea typeface="Overpass"/>
-                  <a:cs typeface="Overpass"/>
+                  <a:cs typeface="Arial" panose="020B0604020202020204" pitchFamily="34" charset="0"/>
                   <a:sym typeface="Overpass"/>
                 </a:rPr>
                 <a:t>Vimar</a:t>
               </a:r>
-              <a:endParaRPr lang="en-US" sz="2100" dirty="0">
-                <a:solidFill>
-                  <a:srgbClr val="000000"/>
-                </a:solidFill>
-                <a:latin typeface="Overpass"/>
-                <a:ea typeface="Overpass"/>
-                <a:cs typeface="Overpass"/>
-                <a:sym typeface="Overpass"/>
-              </a:endParaRPr>
-            </a:p>
-            <a:p>
-              <a:pPr marL="489056" lvl="1" indent="-244528" algn="l">
-                <a:lnSpc>
-                  <a:spcPct val="150000"/>
-                </a:lnSpc>
-                <a:buFont typeface="Arial"/>
-                <a:buChar char="•"/>
-              </a:pPr>
-              <a:r>
-                <a:rPr lang="en-US" sz="2100" dirty="0" err="1">
-                  <a:solidFill>
-                    <a:srgbClr val="000000"/>
-                  </a:solidFill>
-                  <a:latin typeface="Overpass"/>
-                  <a:ea typeface="Overpass"/>
-                  <a:cs typeface="Overpass"/>
-                  <a:sym typeface="Overpass"/>
-                </a:rPr>
-                <a:t>Analisi</a:t>
-              </a:r>
-              <a:r>
-                <a:rPr lang="en-US" sz="2100" dirty="0">
-                  <a:solidFill>
-                    <a:srgbClr val="000000"/>
-                  </a:solidFill>
-                  <a:latin typeface="Overpass"/>
-                  <a:ea typeface="Overpass"/>
-                  <a:cs typeface="Overpass"/>
-                  <a:sym typeface="Overpass"/>
-                </a:rPr>
-                <a:t> </a:t>
-              </a:r>
-              <a:r>
-                <a:rPr lang="en-US" sz="2100" dirty="0" err="1">
-                  <a:solidFill>
-                    <a:srgbClr val="000000"/>
-                  </a:solidFill>
-                  <a:latin typeface="Overpass"/>
-                  <a:ea typeface="Overpass"/>
-                  <a:cs typeface="Overpass"/>
-                  <a:sym typeface="Overpass"/>
-                </a:rPr>
-                <a:t>dettagliata</a:t>
-              </a:r>
-              <a:r>
-                <a:rPr lang="en-US" sz="2100" dirty="0">
-                  <a:solidFill>
-                    <a:srgbClr val="000000"/>
-                  </a:solidFill>
-                  <a:latin typeface="Overpass"/>
-                  <a:ea typeface="Overpass"/>
-                  <a:cs typeface="Overpass"/>
-                  <a:sym typeface="Overpass"/>
-                </a:rPr>
-                <a:t> di tutti </a:t>
-              </a:r>
-              <a:r>
-                <a:rPr lang="en-US" sz="2100" dirty="0" err="1">
-                  <a:solidFill>
-                    <a:srgbClr val="000000"/>
-                  </a:solidFill>
-                  <a:latin typeface="Overpass"/>
-                  <a:ea typeface="Overpass"/>
-                  <a:cs typeface="Overpass"/>
-                  <a:sym typeface="Overpass"/>
-                </a:rPr>
-                <a:t>i</a:t>
-              </a:r>
-              <a:r>
-                <a:rPr lang="en-US" sz="2100" dirty="0">
-                  <a:solidFill>
-                    <a:srgbClr val="000000"/>
-                  </a:solidFill>
-                  <a:latin typeface="Overpass"/>
-                  <a:ea typeface="Overpass"/>
-                  <a:cs typeface="Overpass"/>
-                  <a:sym typeface="Overpass"/>
-                </a:rPr>
-                <a:t> </a:t>
-              </a:r>
-              <a:r>
-                <a:rPr lang="en-US" sz="2100" dirty="0" err="1">
-                  <a:solidFill>
-                    <a:srgbClr val="000000"/>
-                  </a:solidFill>
-                  <a:latin typeface="Overpass"/>
-                  <a:ea typeface="Overpass"/>
-                  <a:cs typeface="Overpass"/>
-                  <a:sym typeface="Overpass"/>
-                </a:rPr>
-                <a:t>capitolati</a:t>
-              </a:r>
-              <a:endParaRPr lang="en-US" sz="2100" dirty="0">
-                <a:solidFill>
-                  <a:srgbClr val="000000"/>
-                </a:solidFill>
-                <a:latin typeface="Overpass"/>
-                <a:ea typeface="Overpass"/>
-                <a:cs typeface="Overpass"/>
-                <a:sym typeface="Overpass"/>
-              </a:endParaRPr>
-            </a:p>
-            <a:p>
-              <a:pPr marL="489056" lvl="1" indent="-244528" algn="l">
-                <a:lnSpc>
-                  <a:spcPct val="150000"/>
-                </a:lnSpc>
-                <a:buFont typeface="Arial"/>
-                <a:buChar char="•"/>
-              </a:pPr>
-              <a:r>
-                <a:rPr lang="en-US" sz="2100" dirty="0" err="1">
-                  <a:solidFill>
-                    <a:srgbClr val="000000"/>
-                  </a:solidFill>
-                  <a:latin typeface="Overpass"/>
-                  <a:ea typeface="Overpass"/>
-                  <a:cs typeface="Overpass"/>
-                  <a:sym typeface="Overpass"/>
-                </a:rPr>
-                <a:t>Scelta</a:t>
-              </a:r>
-              <a:r>
-                <a:rPr lang="en-US" sz="2100" dirty="0">
-                  <a:solidFill>
-                    <a:srgbClr val="000000"/>
-                  </a:solidFill>
-                  <a:latin typeface="Overpass"/>
-                  <a:ea typeface="Overpass"/>
-                  <a:cs typeface="Overpass"/>
-                  <a:sym typeface="Overpass"/>
-                </a:rPr>
-                <a:t> finale: C9 - View4Life (</a:t>
-              </a:r>
-              <a:r>
-                <a:rPr lang="en-US" sz="2100" dirty="0" err="1">
-                  <a:solidFill>
-                    <a:srgbClr val="000000"/>
-                  </a:solidFill>
-                  <a:latin typeface="Overpass"/>
-                  <a:ea typeface="Overpass"/>
-                  <a:cs typeface="Overpass"/>
-                  <a:sym typeface="Overpass"/>
-                </a:rPr>
-                <a:t>Vimar</a:t>
-              </a:r>
-              <a:r>
-                <a:rPr lang="en-US" sz="2100" dirty="0">
-                  <a:solidFill>
-                    <a:srgbClr val="000000"/>
-                  </a:solidFill>
-                  <a:latin typeface="Overpass"/>
-                  <a:ea typeface="Overpass"/>
-                  <a:cs typeface="Overpass"/>
-                  <a:sym typeface="Overpass"/>
-                </a:rPr>
-                <a:t>)</a:t>
-              </a:r>
-            </a:p>
-            <a:p>
-              <a:pPr marL="489056" lvl="1" indent="-244528" algn="l">
-                <a:lnSpc>
-                  <a:spcPct val="150000"/>
-                </a:lnSpc>
-                <a:buFont typeface="Arial"/>
-                <a:buChar char="•"/>
-              </a:pPr>
-              <a:r>
-                <a:rPr lang="en-US" sz="2100" dirty="0" err="1">
-                  <a:solidFill>
-                    <a:srgbClr val="000000"/>
-                  </a:solidFill>
-                  <a:latin typeface="Overpass"/>
-                  <a:ea typeface="Overpass"/>
-                  <a:cs typeface="Overpass"/>
-                  <a:sym typeface="Overpass"/>
-                </a:rPr>
-                <a:t>Candidatura</a:t>
-              </a:r>
-              <a:r>
-                <a:rPr lang="en-US" sz="2100" dirty="0">
-                  <a:solidFill>
-                    <a:srgbClr val="000000"/>
-                  </a:solidFill>
-                  <a:latin typeface="Overpass"/>
-                  <a:ea typeface="Overpass"/>
-                  <a:cs typeface="Overpass"/>
-                  <a:sym typeface="Overpass"/>
-                </a:rPr>
-                <a:t> </a:t>
-              </a:r>
-              <a:r>
-                <a:rPr lang="en-US" sz="2100" dirty="0" err="1">
-                  <a:solidFill>
-                    <a:srgbClr val="000000"/>
-                  </a:solidFill>
-                  <a:latin typeface="Overpass"/>
-                  <a:ea typeface="Overpass"/>
-                  <a:cs typeface="Overpass"/>
-                  <a:sym typeface="Overpass"/>
-                </a:rPr>
-                <a:t>formale</a:t>
-              </a:r>
-              <a:r>
-                <a:rPr lang="en-US" sz="2100" dirty="0">
-                  <a:solidFill>
-                    <a:srgbClr val="000000"/>
-                  </a:solidFill>
-                  <a:latin typeface="Overpass"/>
-                  <a:ea typeface="Overpass"/>
-                  <a:cs typeface="Overpass"/>
-                  <a:sym typeface="Overpass"/>
-                </a:rPr>
-                <a:t> per il </a:t>
-              </a:r>
-              <a:r>
-                <a:rPr lang="en-US" sz="2100" dirty="0" err="1">
-                  <a:solidFill>
-                    <a:srgbClr val="000000"/>
-                  </a:solidFill>
-                  <a:latin typeface="Overpass"/>
-                  <a:ea typeface="Overpass"/>
-                  <a:cs typeface="Overpass"/>
-                  <a:sym typeface="Overpass"/>
-                </a:rPr>
-                <a:t>capitolato</a:t>
-              </a:r>
-              <a:r>
-                <a:rPr lang="en-US" sz="2100" dirty="0">
-                  <a:solidFill>
-                    <a:srgbClr val="000000"/>
-                  </a:solidFill>
-                  <a:latin typeface="Overpass"/>
-                  <a:ea typeface="Overpass"/>
-                  <a:cs typeface="Overpass"/>
-                  <a:sym typeface="Overpass"/>
-                </a:rPr>
-                <a:t> C9</a:t>
-              </a:r>
-            </a:p>
-            <a:p>
-              <a:pPr marL="489056" lvl="1" indent="-244528" algn="l">
-                <a:lnSpc>
-                  <a:spcPct val="150000"/>
-                </a:lnSpc>
-                <a:buFont typeface="Arial"/>
-                <a:buChar char="•"/>
-              </a:pPr>
-              <a:r>
-                <a:rPr lang="en-US" sz="2100" dirty="0" err="1">
-                  <a:solidFill>
-                    <a:srgbClr val="000000"/>
-                  </a:solidFill>
-                  <a:latin typeface="Overpass"/>
-                  <a:ea typeface="Overpass"/>
-                  <a:cs typeface="Overpass"/>
-                  <a:sym typeface="Overpass"/>
-                </a:rPr>
-                <a:t>Dichiarazione</a:t>
-              </a:r>
-              <a:r>
-                <a:rPr lang="en-US" sz="2100" dirty="0">
-                  <a:solidFill>
-                    <a:srgbClr val="000000"/>
-                  </a:solidFill>
-                  <a:latin typeface="Overpass"/>
-                  <a:ea typeface="Overpass"/>
-                  <a:cs typeface="Overpass"/>
-                  <a:sym typeface="Overpass"/>
-                </a:rPr>
-                <a:t> </a:t>
-              </a:r>
-              <a:r>
-                <a:rPr lang="en-US" sz="2100" dirty="0" err="1">
-                  <a:solidFill>
-                    <a:srgbClr val="000000"/>
-                  </a:solidFill>
-                  <a:latin typeface="Overpass"/>
-                  <a:ea typeface="Overpass"/>
-                  <a:cs typeface="Overpass"/>
-                  <a:sym typeface="Overpass"/>
-                </a:rPr>
-                <a:t>degli</a:t>
-              </a:r>
-              <a:r>
-                <a:rPr lang="en-US" sz="2100" dirty="0">
-                  <a:solidFill>
-                    <a:srgbClr val="000000"/>
-                  </a:solidFill>
-                  <a:latin typeface="Overpass"/>
-                  <a:ea typeface="Overpass"/>
-                  <a:cs typeface="Overpass"/>
-                  <a:sym typeface="Overpass"/>
-                </a:rPr>
-                <a:t> </a:t>
-              </a:r>
-              <a:r>
-                <a:rPr lang="en-US" sz="2100" dirty="0" err="1">
-                  <a:solidFill>
-                    <a:srgbClr val="000000"/>
-                  </a:solidFill>
-                  <a:latin typeface="Overpass"/>
-                  <a:ea typeface="Overpass"/>
-                  <a:cs typeface="Overpass"/>
-                  <a:sym typeface="Overpass"/>
-                </a:rPr>
-                <a:t>impegni</a:t>
-              </a:r>
-              <a:endParaRPr lang="en-US" sz="2100" dirty="0">
-                <a:solidFill>
-                  <a:srgbClr val="000000"/>
-                </a:solidFill>
-                <a:latin typeface="Overpass"/>
-                <a:ea typeface="Overpass"/>
-                <a:cs typeface="Overpass"/>
-                <a:sym typeface="Overpass"/>
-              </a:endParaRPr>
-            </a:p>
-            <a:p>
-              <a:pPr marL="489056" lvl="1" indent="-244528" algn="l">
-                <a:lnSpc>
-                  <a:spcPct val="150000"/>
-                </a:lnSpc>
-                <a:buFont typeface="Arial"/>
-                <a:buChar char="•"/>
-              </a:pPr>
-              <a:r>
-                <a:rPr lang="en-US" sz="2100" dirty="0" err="1">
-                  <a:solidFill>
-                    <a:srgbClr val="000000"/>
-                  </a:solidFill>
-                  <a:latin typeface="Overpass"/>
-                  <a:ea typeface="Overpass"/>
-                  <a:cs typeface="Overpass"/>
-                  <a:sym typeface="Overpass"/>
-                </a:rPr>
-                <a:t>Iniziato</a:t>
-              </a:r>
-              <a:r>
-                <a:rPr lang="en-US" sz="2100" dirty="0">
-                  <a:solidFill>
-                    <a:srgbClr val="000000"/>
-                  </a:solidFill>
-                  <a:latin typeface="Overpass"/>
-                  <a:ea typeface="Overpass"/>
-                  <a:cs typeface="Overpass"/>
-                  <a:sym typeface="Overpass"/>
-                </a:rPr>
-                <a:t> a </a:t>
-              </a:r>
-              <a:r>
-                <a:rPr lang="en-US" sz="2100" dirty="0" err="1">
-                  <a:solidFill>
-                    <a:srgbClr val="000000"/>
-                  </a:solidFill>
-                  <a:latin typeface="Overpass"/>
-                  <a:ea typeface="Overpass"/>
-                  <a:cs typeface="Overpass"/>
-                  <a:sym typeface="Overpass"/>
-                </a:rPr>
-                <a:t>scrivere</a:t>
-              </a:r>
-              <a:r>
-                <a:rPr lang="en-US" sz="2100" dirty="0">
-                  <a:solidFill>
-                    <a:srgbClr val="000000"/>
-                  </a:solidFill>
-                  <a:latin typeface="Overpass"/>
-                  <a:ea typeface="Overpass"/>
-                  <a:cs typeface="Overpass"/>
-                  <a:sym typeface="Overpass"/>
-                </a:rPr>
-                <a:t> il </a:t>
-              </a:r>
-              <a:r>
-                <a:rPr lang="en-US" sz="2100" dirty="0" err="1">
-                  <a:solidFill>
-                    <a:srgbClr val="000000"/>
-                  </a:solidFill>
-                  <a:latin typeface="Overpass"/>
-                  <a:ea typeface="Overpass"/>
-                  <a:cs typeface="Overpass"/>
-                  <a:sym typeface="Overpass"/>
-                </a:rPr>
-                <a:t>glossario</a:t>
-              </a:r>
-              <a:endParaRPr lang="en-US" sz="2100" dirty="0">
-                <a:solidFill>
-                  <a:srgbClr val="000000"/>
-                </a:solidFill>
-                <a:latin typeface="Overpass"/>
-                <a:ea typeface="Overpass"/>
-                <a:cs typeface="Overpass"/>
-                <a:sym typeface="Overpass"/>
-              </a:endParaRPr>
-            </a:p>
-            <a:p>
-              <a:pPr marL="489056" lvl="1" indent="-244528" algn="l">
-                <a:lnSpc>
-                  <a:spcPct val="150000"/>
-                </a:lnSpc>
-                <a:buFont typeface="Arial"/>
-                <a:buChar char="•"/>
-              </a:pPr>
-              <a:r>
-                <a:rPr lang="en-US" sz="2100" dirty="0" err="1">
-                  <a:solidFill>
-                    <a:srgbClr val="000000"/>
-                  </a:solidFill>
-                  <a:latin typeface="Overpass"/>
-                  <a:ea typeface="Overpass"/>
-                  <a:cs typeface="Overpass"/>
-                  <a:sym typeface="Overpass"/>
-                </a:rPr>
-                <a:t>Abbiamo</a:t>
-              </a:r>
-              <a:r>
-                <a:rPr lang="en-US" sz="2100" dirty="0">
-                  <a:solidFill>
-                    <a:srgbClr val="000000"/>
-                  </a:solidFill>
-                  <a:latin typeface="Overpass"/>
-                  <a:ea typeface="Overpass"/>
-                  <a:cs typeface="Overpass"/>
-                  <a:sym typeface="Overpass"/>
-                </a:rPr>
-                <a:t> </a:t>
-              </a:r>
-              <a:r>
-                <a:rPr lang="en-US" sz="2100" dirty="0" err="1">
-                  <a:solidFill>
-                    <a:srgbClr val="000000"/>
-                  </a:solidFill>
-                  <a:latin typeface="Overpass"/>
-                  <a:ea typeface="Overpass"/>
-                  <a:cs typeface="Overpass"/>
-                  <a:sym typeface="Overpass"/>
-                </a:rPr>
-                <a:t>creato</a:t>
-              </a:r>
-              <a:r>
-                <a:rPr lang="en-US" sz="2100" dirty="0">
-                  <a:solidFill>
-                    <a:srgbClr val="000000"/>
-                  </a:solidFill>
-                  <a:latin typeface="Overpass"/>
-                  <a:ea typeface="Overpass"/>
-                  <a:cs typeface="Overpass"/>
-                  <a:sym typeface="Overpass"/>
-                </a:rPr>
-                <a:t> il nostro repository GitHub</a:t>
-              </a:r>
-            </a:p>
-            <a:p>
-              <a:pPr marL="489056" lvl="1" indent="-244528" algn="l">
-                <a:lnSpc>
-                  <a:spcPct val="150000"/>
-                </a:lnSpc>
-                <a:buFont typeface="Arial"/>
-                <a:buChar char="•"/>
-              </a:pPr>
-              <a:r>
-                <a:rPr lang="en-US" sz="2100" dirty="0" err="1">
-                  <a:solidFill>
-                    <a:srgbClr val="000000"/>
-                  </a:solidFill>
-                  <a:latin typeface="Overpass"/>
-                  <a:ea typeface="Overpass"/>
-                  <a:cs typeface="Overpass"/>
-                  <a:sym typeface="Overpass"/>
-                </a:rPr>
-                <a:t>Abbiamo</a:t>
-              </a:r>
-              <a:r>
-                <a:rPr lang="en-US" sz="2100" dirty="0">
-                  <a:solidFill>
-                    <a:srgbClr val="000000"/>
-                  </a:solidFill>
-                  <a:latin typeface="Overpass"/>
-                  <a:ea typeface="Overpass"/>
-                  <a:cs typeface="Overpass"/>
-                  <a:sym typeface="Overpass"/>
-                </a:rPr>
-                <a:t> </a:t>
-              </a:r>
-              <a:r>
-                <a:rPr lang="en-US" sz="2100" dirty="0" err="1">
-                  <a:solidFill>
-                    <a:srgbClr val="000000"/>
-                  </a:solidFill>
-                  <a:latin typeface="Overpass"/>
-                  <a:ea typeface="Overpass"/>
-                  <a:cs typeface="Overpass"/>
-                  <a:sym typeface="Overpass"/>
-                </a:rPr>
-                <a:t>creato</a:t>
-              </a:r>
-              <a:r>
-                <a:rPr lang="en-US" sz="2100" dirty="0">
-                  <a:solidFill>
-                    <a:srgbClr val="000000"/>
-                  </a:solidFill>
-                  <a:latin typeface="Overpass"/>
-                  <a:ea typeface="Overpass"/>
-                  <a:cs typeface="Overpass"/>
-                  <a:sym typeface="Overpass"/>
-                </a:rPr>
-                <a:t> il </a:t>
-              </a:r>
-              <a:r>
-                <a:rPr lang="en-US" sz="2100" dirty="0" err="1">
-                  <a:solidFill>
-                    <a:srgbClr val="000000"/>
-                  </a:solidFill>
-                  <a:latin typeface="Overpass"/>
-                  <a:ea typeface="Overpass"/>
-                  <a:cs typeface="Overpass"/>
-                  <a:sym typeface="Overpass"/>
-                </a:rPr>
-                <a:t>sito</a:t>
-              </a:r>
-              <a:endParaRPr lang="en-US" sz="2100" dirty="0">
-                <a:solidFill>
-                  <a:srgbClr val="000000"/>
-                </a:solidFill>
-                <a:latin typeface="Overpass"/>
-                <a:ea typeface="Overpass"/>
-                <a:cs typeface="Overpass"/>
-                <a:sym typeface="Overpass"/>
-              </a:endParaRPr>
             </a:p>
           </p:txBody>
         </p:sp>
@@ -4854,7 +4417,7 @@
           <p:spPr>
             <a:xfrm>
               <a:off x="0" y="471724"/>
-              <a:ext cx="23422050" cy="2574925"/>
+              <a:ext cx="23422050" cy="2455030"/>
             </a:xfrm>
             <a:prstGeom prst="rect">
               <a:avLst/>
@@ -4872,21 +4435,245 @@
                 </a:lnSpc>
               </a:pPr>
               <a:r>
-                <a:rPr lang="en-US" sz="12677" dirty="0">
+                <a:rPr lang="it-IT" sz="12000" b="1" noProof="0" dirty="0">
                   <a:solidFill>
                     <a:srgbClr val="000000"/>
                   </a:solidFill>
-                  <a:latin typeface="Fredoka"/>
+                  <a:latin typeface="Goudy" panose="020B0604020202020204" charset="0"/>
                   <a:ea typeface="Fredoka"/>
                   <a:cs typeface="Fredoka"/>
                   <a:sym typeface="Fredoka"/>
                 </a:rPr>
-                <a:t>ATTIVITÁ SVOLTE</a:t>
+                <a:t>ATTIVITÀ SVOLTE</a:t>
               </a:r>
             </a:p>
           </p:txBody>
         </p:sp>
       </p:grpSp>
+      <p:sp>
+        <p:nvSpPr>
+          <p:cNvPr id="10" name="CasellaDiTesto 9">
+            <a:extLst>
+              <a:ext uri="{FF2B5EF4-FFF2-40B4-BE49-F238E27FC236}">
+                <a16:creationId xmlns:a16="http://schemas.microsoft.com/office/drawing/2014/main" id="{1C2EA72E-9248-B9E8-48BD-1D01611DB3C9}"/>
+              </a:ext>
+            </a:extLst>
+          </p:cNvPr>
+          <p:cNvSpPr txBox="1"/>
+          <p:nvPr/>
+        </p:nvSpPr>
+        <p:spPr>
+          <a:xfrm>
+            <a:off x="9677400" y="2533608"/>
+            <a:ext cx="9491868" cy="4857868"/>
+          </a:xfrm>
+          <a:prstGeom prst="rect">
+            <a:avLst/>
+          </a:prstGeom>
+          <a:noFill/>
+        </p:spPr>
+        <p:txBody>
+          <a:bodyPr wrap="square">
+            <a:spAutoFit/>
+          </a:bodyPr>
+          <a:lstStyle/>
+          <a:p>
+            <a:pPr marL="587428" lvl="1" indent="-342900" algn="l">
+              <a:lnSpc>
+                <a:spcPct val="150000"/>
+              </a:lnSpc>
+              <a:buFont typeface="Wingdings" panose="05000000000000000000" pitchFamily="2" charset="2"/>
+              <a:buChar char="Ø"/>
+            </a:pPr>
+            <a:r>
+              <a:rPr lang="it-IT" sz="3000" noProof="0" dirty="0">
+                <a:solidFill>
+                  <a:srgbClr val="000000"/>
+                </a:solidFill>
+                <a:latin typeface="Overpass"/>
+                <a:ea typeface="Overpass"/>
+                <a:cs typeface="Arial" panose="020B0604020202020204" pitchFamily="34" charset="0"/>
+                <a:sym typeface="Overpass"/>
+              </a:rPr>
+              <a:t>Analisi dettagliata di tutti i capitolati</a:t>
+            </a:r>
+          </a:p>
+          <a:p>
+            <a:pPr marL="587428" lvl="1" indent="-342900" algn="l">
+              <a:lnSpc>
+                <a:spcPct val="150000"/>
+              </a:lnSpc>
+              <a:buFont typeface="Wingdings" panose="05000000000000000000" pitchFamily="2" charset="2"/>
+              <a:buChar char="Ø"/>
+            </a:pPr>
+            <a:r>
+              <a:rPr lang="it-IT" sz="3000" noProof="0" dirty="0">
+                <a:solidFill>
+                  <a:srgbClr val="000000"/>
+                </a:solidFill>
+                <a:latin typeface="Overpass"/>
+                <a:ea typeface="Overpass"/>
+                <a:cs typeface="Arial" panose="020B0604020202020204" pitchFamily="34" charset="0"/>
+                <a:sym typeface="Overpass"/>
+              </a:rPr>
+              <a:t>Scelta finale: C5 – </a:t>
+            </a:r>
+            <a:r>
+              <a:rPr lang="it-IT" sz="3000" noProof="0" dirty="0" err="1">
+                <a:solidFill>
+                  <a:srgbClr val="000000"/>
+                </a:solidFill>
+                <a:latin typeface="Overpass"/>
+                <a:ea typeface="Overpass"/>
+                <a:cs typeface="Arial" panose="020B0604020202020204" pitchFamily="34" charset="0"/>
+                <a:sym typeface="Overpass"/>
+              </a:rPr>
+              <a:t>Nexum</a:t>
+            </a:r>
+            <a:r>
+              <a:rPr lang="it-IT" sz="3000" noProof="0" dirty="0">
+                <a:solidFill>
+                  <a:srgbClr val="000000"/>
+                </a:solidFill>
+                <a:latin typeface="Overpass"/>
+                <a:ea typeface="Overpass"/>
+                <a:cs typeface="Arial" panose="020B0604020202020204" pitchFamily="34" charset="0"/>
+                <a:sym typeface="Overpass"/>
+              </a:rPr>
+              <a:t> (</a:t>
+            </a:r>
+            <a:r>
+              <a:rPr lang="it-IT" sz="3000" noProof="0" dirty="0" err="1">
+                <a:solidFill>
+                  <a:srgbClr val="000000"/>
+                </a:solidFill>
+                <a:latin typeface="Overpass"/>
+                <a:ea typeface="Overpass"/>
+                <a:cs typeface="Arial" panose="020B0604020202020204" pitchFamily="34" charset="0"/>
+                <a:sym typeface="Overpass"/>
+              </a:rPr>
+              <a:t>Eggon</a:t>
+            </a:r>
+            <a:r>
+              <a:rPr lang="it-IT" sz="3000" noProof="0" dirty="0">
+                <a:solidFill>
+                  <a:srgbClr val="000000"/>
+                </a:solidFill>
+                <a:latin typeface="Overpass"/>
+                <a:ea typeface="Overpass"/>
+                <a:cs typeface="Arial" panose="020B0604020202020204" pitchFamily="34" charset="0"/>
+                <a:sym typeface="Overpass"/>
+              </a:rPr>
+              <a:t>)</a:t>
+            </a:r>
+          </a:p>
+          <a:p>
+            <a:pPr marL="587428" lvl="1" indent="-342900" algn="l">
+              <a:lnSpc>
+                <a:spcPct val="150000"/>
+              </a:lnSpc>
+              <a:buFont typeface="Wingdings" panose="05000000000000000000" pitchFamily="2" charset="2"/>
+              <a:buChar char="Ø"/>
+            </a:pPr>
+            <a:r>
+              <a:rPr lang="it-IT" sz="3000" noProof="0" dirty="0">
+                <a:solidFill>
+                  <a:srgbClr val="000000"/>
+                </a:solidFill>
+                <a:latin typeface="Overpass"/>
+                <a:ea typeface="Overpass"/>
+                <a:cs typeface="Arial" panose="020B0604020202020204" pitchFamily="34" charset="0"/>
+                <a:sym typeface="Overpass"/>
+              </a:rPr>
+              <a:t>Candidatura formale per il capitolato C5</a:t>
+            </a:r>
+          </a:p>
+          <a:p>
+            <a:pPr marL="587428" lvl="1" indent="-342900" algn="l">
+              <a:lnSpc>
+                <a:spcPct val="150000"/>
+              </a:lnSpc>
+              <a:buFont typeface="Wingdings" panose="05000000000000000000" pitchFamily="2" charset="2"/>
+              <a:buChar char="Ø"/>
+            </a:pPr>
+            <a:r>
+              <a:rPr lang="it-IT" sz="3000" noProof="0" dirty="0">
+                <a:solidFill>
+                  <a:srgbClr val="000000"/>
+                </a:solidFill>
+                <a:latin typeface="Overpass"/>
+                <a:ea typeface="Overpass"/>
+                <a:cs typeface="Arial" panose="020B0604020202020204" pitchFamily="34" charset="0"/>
+                <a:sym typeface="Overpass"/>
+              </a:rPr>
+              <a:t>Dichiarazione degli impegni</a:t>
+            </a:r>
+          </a:p>
+          <a:p>
+            <a:pPr marL="587428" lvl="1" indent="-342900" algn="l">
+              <a:lnSpc>
+                <a:spcPct val="150000"/>
+              </a:lnSpc>
+              <a:buFont typeface="Wingdings" panose="05000000000000000000" pitchFamily="2" charset="2"/>
+              <a:buChar char="Ø"/>
+            </a:pPr>
+            <a:r>
+              <a:rPr lang="it-IT" sz="3000" noProof="0" dirty="0">
+                <a:solidFill>
+                  <a:srgbClr val="000000"/>
+                </a:solidFill>
+                <a:latin typeface="Overpass"/>
+                <a:ea typeface="Overpass"/>
+                <a:cs typeface="Arial" panose="020B0604020202020204" pitchFamily="34" charset="0"/>
+                <a:sym typeface="Overpass"/>
+              </a:rPr>
+              <a:t>Iniziato a scrivere il glossario</a:t>
+            </a:r>
+          </a:p>
+          <a:p>
+            <a:pPr marL="587428" lvl="1" indent="-342900" algn="l">
+              <a:lnSpc>
+                <a:spcPct val="150000"/>
+              </a:lnSpc>
+              <a:buFont typeface="Wingdings" panose="05000000000000000000" pitchFamily="2" charset="2"/>
+              <a:buChar char="Ø"/>
+            </a:pPr>
+            <a:r>
+              <a:rPr lang="it-IT" sz="3000" noProof="0" dirty="0">
+                <a:solidFill>
+                  <a:srgbClr val="000000"/>
+                </a:solidFill>
+                <a:latin typeface="Overpass"/>
+                <a:ea typeface="Overpass"/>
+                <a:cs typeface="Arial" panose="020B0604020202020204" pitchFamily="34" charset="0"/>
+                <a:sym typeface="Overpass"/>
+              </a:rPr>
+              <a:t>Abbiamo creato il nostro repository GitHub</a:t>
+            </a:r>
+          </a:p>
+          <a:p>
+            <a:pPr marL="587428" lvl="1" indent="-342900" algn="l">
+              <a:lnSpc>
+                <a:spcPct val="150000"/>
+              </a:lnSpc>
+              <a:buFont typeface="Wingdings" panose="05000000000000000000" pitchFamily="2" charset="2"/>
+              <a:buChar char="Ø"/>
+            </a:pPr>
+            <a:r>
+              <a:rPr lang="it-IT" sz="3000" noProof="0" dirty="0">
+                <a:solidFill>
+                  <a:srgbClr val="000000"/>
+                </a:solidFill>
+                <a:latin typeface="Overpass"/>
+                <a:ea typeface="Overpass"/>
+                <a:cs typeface="Arial" panose="020B0604020202020204" pitchFamily="34" charset="0"/>
+                <a:sym typeface="Overpass"/>
+              </a:rPr>
+              <a:t>Abbiamo creato il sito</a:t>
+            </a:r>
+          </a:p>
+        </p:txBody>
+      </p:sp>
     </p:spTree>
   </p:cSld>
   <p:clrMapOvr>
@@ -4922,6 +4709,37 @@
       </p:grpSpPr>
       <p:pic>
         <p:nvPicPr>
+          <p:cNvPr id="7" name="Picture 3">
+            <a:extLst>
+              <a:ext uri="{FF2B5EF4-FFF2-40B4-BE49-F238E27FC236}">
+                <a16:creationId xmlns:a16="http://schemas.microsoft.com/office/drawing/2014/main" id="{F5702CEF-2064-56B0-3DF4-E8FB344C1912}"/>
+              </a:ext>
+            </a:extLst>
+          </p:cNvPr>
+          <p:cNvPicPr>
+            <a:picLocks noChangeAspect="1"/>
+          </p:cNvPicPr>
+          <p:nvPr/>
+        </p:nvPicPr>
+        <p:blipFill>
+          <a:blip r:embed="rId2"/>
+          <a:srcRect r="64034" b="46739"/>
+          <a:stretch>
+            <a:fillRect/>
+          </a:stretch>
+        </p:blipFill>
+        <p:spPr>
+          <a:xfrm rot="-5400000" flipH="1">
+            <a:off x="796991" y="-796988"/>
+            <a:ext cx="3314701" cy="4908680"/>
+          </a:xfrm>
+          <a:prstGeom prst="rect">
+            <a:avLst/>
+          </a:prstGeom>
+        </p:spPr>
+      </p:pic>
+      <p:pic>
+        <p:nvPicPr>
           <p:cNvPr id="2" name="Picture 2"/>
           <p:cNvPicPr>
             <a:picLocks noChangeAspect="1"/>
@@ -4929,7 +4747,7 @@
           <p:nvPr/>
         </p:nvPicPr>
         <p:blipFill>
-          <a:blip r:embed="rId2"/>
+          <a:blip r:embed="rId3"/>
           <a:srcRect l="62989" t="67035"/>
           <a:stretch>
             <a:fillRect/>
@@ -4945,31 +4763,6 @@
           </a:prstGeom>
         </p:spPr>
       </p:pic>
-      <p:pic>
-        <p:nvPicPr>
-          <p:cNvPr id="3" name="Picture 3"/>
-          <p:cNvPicPr>
-            <a:picLocks noChangeAspect="1"/>
-          </p:cNvPicPr>
-          <p:nvPr/>
-        </p:nvPicPr>
-        <p:blipFill>
-          <a:blip r:embed="rId3"/>
-          <a:srcRect r="64034" b="46739"/>
-          <a:stretch>
-            <a:fillRect/>
-          </a:stretch>
-        </p:blipFill>
-        <p:spPr>
-          <a:xfrm rot="-5400000" flipH="1">
-            <a:off x="1041561" y="-1041561"/>
-            <a:ext cx="4331879" cy="6415001"/>
-          </a:xfrm>
-          <a:prstGeom prst="rect">
-            <a:avLst/>
-          </a:prstGeom>
-        </p:spPr>
-      </p:pic>
       <p:grpSp>
         <p:nvGrpSpPr>
           <p:cNvPr id="4" name="Group 4"/>
@@ -4979,9 +4772,9 @@
         <p:grpSpPr>
           <a:xfrm>
             <a:off x="207205" y="186979"/>
-            <a:ext cx="19668373" cy="5699202"/>
+            <a:ext cx="19668373" cy="6568573"/>
             <a:chOff x="0" y="-16005"/>
-            <a:chExt cx="26224497" cy="7598936"/>
+            <a:chExt cx="26224497" cy="8758096"/>
           </a:xfrm>
         </p:grpSpPr>
         <p:sp>
@@ -4992,8 +4785,8 @@
           </p:nvSpPr>
           <p:spPr>
             <a:xfrm>
-              <a:off x="0" y="4154985"/>
-              <a:ext cx="24496982" cy="3427946"/>
+              <a:off x="0" y="4560690"/>
+              <a:ext cx="24496982" cy="4181401"/>
             </a:xfrm>
             <a:prstGeom prst="rect">
               <a:avLst/>
@@ -5005,15 +4798,15 @@
             </a:bodyPr>
             <a:lstStyle/>
             <a:p>
-              <a:pPr marL="834487" lvl="1" indent="-417243" algn="l">
+              <a:pPr marL="988744" lvl="1" indent="-571500" algn="l">
                 <a:lnSpc>
                   <a:spcPct val="150000"/>
                 </a:lnSpc>
-                <a:buFont typeface="Arial"/>
-                <a:buChar char="•"/>
+                <a:buFont typeface="Wingdings" panose="05000000000000000000" pitchFamily="2" charset="2"/>
+                <a:buChar char="Ø"/>
               </a:pPr>
               <a:r>
-                <a:rPr lang="en-US" sz="3865" dirty="0" err="1">
+                <a:rPr lang="it-IT" sz="3500" noProof="0" dirty="0">
                   <a:solidFill>
                     <a:srgbClr val="000000"/>
                   </a:solidFill>
@@ -5022,10 +4815,19 @@
                   <a:cs typeface="Overpass"/>
                   <a:sym typeface="Overpass"/>
                 </a:rPr>
-                <a:t>Completare</a:t>
+                <a:t>Completare e sistemare alcune sezioni dei documenti già redatti</a:t>
               </a:r>
+            </a:p>
+            <a:p>
+              <a:pPr marL="988744" lvl="1" indent="-571500" algn="l">
+                <a:lnSpc>
+                  <a:spcPct val="150000"/>
+                </a:lnSpc>
+                <a:buFont typeface="Wingdings" panose="05000000000000000000" pitchFamily="2" charset="2"/>
+                <a:buChar char="Ø"/>
+              </a:pPr>
               <a:r>
-                <a:rPr lang="en-US" sz="3865" dirty="0">
+                <a:rPr lang="it-IT" sz="3500" noProof="0" dirty="0">
                   <a:solidFill>
                     <a:srgbClr val="000000"/>
                   </a:solidFill>
@@ -5034,10 +4836,19 @@
                   <a:cs typeface="Overpass"/>
                   <a:sym typeface="Overpass"/>
                 </a:rPr>
-                <a:t> e </a:t>
+                <a:t>Suddividere i compiti per ruoli</a:t>
               </a:r>
+            </a:p>
+            <a:p>
+              <a:pPr marL="988744" lvl="1" indent="-571500" algn="l">
+                <a:lnSpc>
+                  <a:spcPct val="150000"/>
+                </a:lnSpc>
+                <a:buFont typeface="Wingdings" panose="05000000000000000000" pitchFamily="2" charset="2"/>
+                <a:buChar char="Ø"/>
+              </a:pPr>
               <a:r>
-                <a:rPr lang="en-US" sz="3865" dirty="0" err="1">
+                <a:rPr lang="it-IT" sz="3500" noProof="0" dirty="0">
                   <a:solidFill>
                     <a:srgbClr val="000000"/>
                   </a:solidFill>
@@ -5046,10 +4857,19 @@
                   <a:cs typeface="Overpass"/>
                   <a:sym typeface="Overpass"/>
                 </a:rPr>
-                <a:t>sistemare</a:t>
+                <a:t>Continuare la creazione di contenuti del file “Norme di Progetto”</a:t>
               </a:r>
+            </a:p>
+            <a:p>
+              <a:pPr marL="988744" lvl="1" indent="-571500" algn="l">
+                <a:lnSpc>
+                  <a:spcPct val="150000"/>
+                </a:lnSpc>
+                <a:buFont typeface="Wingdings" panose="05000000000000000000" pitchFamily="2" charset="2"/>
+                <a:buChar char="Ø"/>
+              </a:pPr>
               <a:r>
-                <a:rPr lang="en-US" sz="3865" dirty="0">
+                <a:rPr lang="it-IT" sz="3500" dirty="0">
                   <a:solidFill>
                     <a:srgbClr val="000000"/>
                   </a:solidFill>
@@ -5058,297 +4878,9 @@
                   <a:cs typeface="Overpass"/>
                   <a:sym typeface="Overpass"/>
                 </a:rPr>
-                <a:t> </a:t>
+                <a:t>Aggiornamento glossario</a:t>
               </a:r>
-              <a:r>
-                <a:rPr lang="en-US" sz="3865" dirty="0" err="1">
-                  <a:solidFill>
-                    <a:srgbClr val="000000"/>
-                  </a:solidFill>
-                  <a:latin typeface="Overpass"/>
-                  <a:ea typeface="Overpass"/>
-                  <a:cs typeface="Overpass"/>
-                  <a:sym typeface="Overpass"/>
-                </a:rPr>
-                <a:t>alcune</a:t>
-              </a:r>
-              <a:r>
-                <a:rPr lang="en-US" sz="3865" dirty="0">
-                  <a:solidFill>
-                    <a:srgbClr val="000000"/>
-                  </a:solidFill>
-                  <a:latin typeface="Overpass"/>
-                  <a:ea typeface="Overpass"/>
-                  <a:cs typeface="Overpass"/>
-                  <a:sym typeface="Overpass"/>
-                </a:rPr>
-                <a:t> </a:t>
-              </a:r>
-              <a:r>
-                <a:rPr lang="en-US" sz="3865" dirty="0" err="1">
-                  <a:solidFill>
-                    <a:srgbClr val="000000"/>
-                  </a:solidFill>
-                  <a:latin typeface="Overpass"/>
-                  <a:ea typeface="Overpass"/>
-                  <a:cs typeface="Overpass"/>
-                  <a:sym typeface="Overpass"/>
-                </a:rPr>
-                <a:t>sezioni</a:t>
-              </a:r>
-              <a:r>
-                <a:rPr lang="en-US" sz="3865" dirty="0">
-                  <a:solidFill>
-                    <a:srgbClr val="000000"/>
-                  </a:solidFill>
-                  <a:latin typeface="Overpass"/>
-                  <a:ea typeface="Overpass"/>
-                  <a:cs typeface="Overpass"/>
-                  <a:sym typeface="Overpass"/>
-                </a:rPr>
-                <a:t> </a:t>
-              </a:r>
-              <a:r>
-                <a:rPr lang="en-US" sz="3865" dirty="0" err="1">
-                  <a:solidFill>
-                    <a:srgbClr val="000000"/>
-                  </a:solidFill>
-                  <a:latin typeface="Overpass"/>
-                  <a:ea typeface="Overpass"/>
-                  <a:cs typeface="Overpass"/>
-                  <a:sym typeface="Overpass"/>
-                </a:rPr>
-                <a:t>dei</a:t>
-              </a:r>
-              <a:r>
-                <a:rPr lang="en-US" sz="3865" dirty="0">
-                  <a:solidFill>
-                    <a:srgbClr val="000000"/>
-                  </a:solidFill>
-                  <a:latin typeface="Overpass"/>
-                  <a:ea typeface="Overpass"/>
-                  <a:cs typeface="Overpass"/>
-                  <a:sym typeface="Overpass"/>
-                </a:rPr>
-                <a:t> </a:t>
-              </a:r>
-              <a:r>
-                <a:rPr lang="en-US" sz="3865" dirty="0" err="1">
-                  <a:solidFill>
-                    <a:srgbClr val="000000"/>
-                  </a:solidFill>
-                  <a:latin typeface="Overpass"/>
-                  <a:ea typeface="Overpass"/>
-                  <a:cs typeface="Overpass"/>
-                  <a:sym typeface="Overpass"/>
-                </a:rPr>
-                <a:t>documenti</a:t>
-              </a:r>
-              <a:endParaRPr lang="en-US" sz="3865" dirty="0">
-                <a:solidFill>
-                  <a:srgbClr val="000000"/>
-                </a:solidFill>
-                <a:latin typeface="Overpass"/>
-                <a:ea typeface="Overpass"/>
-                <a:cs typeface="Overpass"/>
-                <a:sym typeface="Overpass"/>
-              </a:endParaRPr>
-            </a:p>
-            <a:p>
-              <a:pPr marL="834487" lvl="1" indent="-417243" algn="l">
-                <a:lnSpc>
-                  <a:spcPct val="150000"/>
-                </a:lnSpc>
-                <a:buFont typeface="Arial"/>
-                <a:buChar char="•"/>
-              </a:pPr>
-              <a:r>
-                <a:rPr lang="en-US" sz="3865" dirty="0" err="1">
-                  <a:solidFill>
-                    <a:srgbClr val="000000"/>
-                  </a:solidFill>
-                  <a:latin typeface="Overpass"/>
-                  <a:ea typeface="Overpass"/>
-                  <a:cs typeface="Overpass"/>
-                  <a:sym typeface="Overpass"/>
-                </a:rPr>
-                <a:t>Suddividere</a:t>
-              </a:r>
-              <a:r>
-                <a:rPr lang="en-US" sz="3865" dirty="0">
-                  <a:solidFill>
-                    <a:srgbClr val="000000"/>
-                  </a:solidFill>
-                  <a:latin typeface="Overpass"/>
-                  <a:ea typeface="Overpass"/>
-                  <a:cs typeface="Overpass"/>
-                  <a:sym typeface="Overpass"/>
-                </a:rPr>
-                <a:t> </a:t>
-              </a:r>
-              <a:r>
-                <a:rPr lang="en-US" sz="3865" dirty="0" err="1">
-                  <a:solidFill>
-                    <a:srgbClr val="000000"/>
-                  </a:solidFill>
-                  <a:latin typeface="Overpass"/>
-                  <a:ea typeface="Overpass"/>
-                  <a:cs typeface="Overpass"/>
-                  <a:sym typeface="Overpass"/>
-                </a:rPr>
-                <a:t>i</a:t>
-              </a:r>
-              <a:r>
-                <a:rPr lang="en-US" sz="3865" dirty="0">
-                  <a:solidFill>
-                    <a:srgbClr val="000000"/>
-                  </a:solidFill>
-                  <a:latin typeface="Overpass"/>
-                  <a:ea typeface="Overpass"/>
-                  <a:cs typeface="Overpass"/>
-                  <a:sym typeface="Overpass"/>
-                </a:rPr>
-                <a:t> </a:t>
-              </a:r>
-              <a:r>
-                <a:rPr lang="en-US" sz="3865" dirty="0" err="1">
-                  <a:solidFill>
-                    <a:srgbClr val="000000"/>
-                  </a:solidFill>
-                  <a:latin typeface="Overpass"/>
-                  <a:ea typeface="Overpass"/>
-                  <a:cs typeface="Overpass"/>
-                  <a:sym typeface="Overpass"/>
-                </a:rPr>
-                <a:t>compiti</a:t>
-              </a:r>
-              <a:r>
-                <a:rPr lang="en-US" sz="3865" dirty="0">
-                  <a:solidFill>
-                    <a:srgbClr val="000000"/>
-                  </a:solidFill>
-                  <a:latin typeface="Overpass"/>
-                  <a:ea typeface="Overpass"/>
-                  <a:cs typeface="Overpass"/>
-                  <a:sym typeface="Overpass"/>
-                </a:rPr>
-                <a:t> per </a:t>
-              </a:r>
-              <a:r>
-                <a:rPr lang="en-US" sz="3865" dirty="0" err="1">
-                  <a:solidFill>
-                    <a:srgbClr val="000000"/>
-                  </a:solidFill>
-                  <a:latin typeface="Overpass"/>
-                  <a:ea typeface="Overpass"/>
-                  <a:cs typeface="Overpass"/>
-                  <a:sym typeface="Overpass"/>
-                </a:rPr>
-                <a:t>ruoli</a:t>
-              </a:r>
-              <a:endParaRPr lang="en-US" sz="3865" dirty="0">
-                <a:solidFill>
-                  <a:srgbClr val="000000"/>
-                </a:solidFill>
-                <a:latin typeface="Overpass"/>
-                <a:ea typeface="Overpass"/>
-                <a:cs typeface="Overpass"/>
-                <a:sym typeface="Overpass"/>
-              </a:endParaRPr>
-            </a:p>
-            <a:p>
-              <a:pPr marL="834487" lvl="1" indent="-417243" algn="l">
-                <a:lnSpc>
-                  <a:spcPct val="150000"/>
-                </a:lnSpc>
-                <a:buFont typeface="Arial"/>
-                <a:buChar char="•"/>
-              </a:pPr>
-              <a:r>
-                <a:rPr lang="en-US" sz="3865" dirty="0" err="1">
-                  <a:solidFill>
-                    <a:srgbClr val="000000"/>
-                  </a:solidFill>
-                  <a:latin typeface="Overpass"/>
-                  <a:ea typeface="Overpass"/>
-                  <a:cs typeface="Overpass"/>
-                  <a:sym typeface="Overpass"/>
-                </a:rPr>
-                <a:t>Definizione</a:t>
-              </a:r>
-              <a:r>
-                <a:rPr lang="en-US" sz="3865" dirty="0">
-                  <a:solidFill>
-                    <a:srgbClr val="000000"/>
-                  </a:solidFill>
-                  <a:latin typeface="Overpass"/>
-                  <a:ea typeface="Overpass"/>
-                  <a:cs typeface="Overpass"/>
-                  <a:sym typeface="Overpass"/>
-                </a:rPr>
-                <a:t> </a:t>
-              </a:r>
-              <a:r>
-                <a:rPr lang="en-US" sz="3865" dirty="0" err="1">
-                  <a:solidFill>
-                    <a:srgbClr val="000000"/>
-                  </a:solidFill>
-                  <a:latin typeface="Overpass"/>
-                  <a:ea typeface="Overpass"/>
-                  <a:cs typeface="Overpass"/>
-                  <a:sym typeface="Overpass"/>
-                </a:rPr>
-                <a:t>requisiti</a:t>
-              </a:r>
-              <a:r>
-                <a:rPr lang="en-US" sz="3865" dirty="0">
-                  <a:solidFill>
-                    <a:srgbClr val="000000"/>
-                  </a:solidFill>
-                  <a:latin typeface="Overpass"/>
-                  <a:ea typeface="Overpass"/>
-                  <a:cs typeface="Overpass"/>
-                  <a:sym typeface="Overpass"/>
-                </a:rPr>
-                <a:t> </a:t>
-              </a:r>
-              <a:r>
-                <a:rPr lang="en-US" sz="3865" dirty="0" err="1">
-                  <a:solidFill>
-                    <a:srgbClr val="000000"/>
-                  </a:solidFill>
-                  <a:latin typeface="Overpass"/>
-                  <a:ea typeface="Overpass"/>
-                  <a:cs typeface="Overpass"/>
-                  <a:sym typeface="Overpass"/>
-                </a:rPr>
-                <a:t>tecnici</a:t>
-              </a:r>
-              <a:r>
-                <a:rPr lang="en-US" sz="3865" dirty="0">
-                  <a:solidFill>
-                    <a:srgbClr val="000000"/>
-                  </a:solidFill>
-                  <a:latin typeface="Overpass"/>
-                  <a:ea typeface="Overpass"/>
-                  <a:cs typeface="Overpass"/>
-                  <a:sym typeface="Overpass"/>
-                </a:rPr>
-                <a:t> </a:t>
-              </a:r>
-              <a:r>
-                <a:rPr lang="en-US" sz="3865" dirty="0" err="1">
-                  <a:solidFill>
-                    <a:srgbClr val="000000"/>
-                  </a:solidFill>
-                  <a:latin typeface="Overpass"/>
-                  <a:ea typeface="Overpass"/>
-                  <a:cs typeface="Overpass"/>
-                  <a:sym typeface="Overpass"/>
-                </a:rPr>
-                <a:t>specifici</a:t>
-              </a:r>
-              <a:endParaRPr lang="en-US" sz="3865" dirty="0">
+              <a:endParaRPr lang="it-IT" sz="3500" noProof="0" dirty="0">
                 <a:solidFill>
                   <a:srgbClr val="000000"/>
                 </a:solidFill>
@@ -5369,7 +4901,7 @@
           <p:spPr>
             <a:xfrm>
               <a:off x="0" y="-16005"/>
-              <a:ext cx="26224497" cy="2574925"/>
+              <a:ext cx="26224497" cy="2455031"/>
             </a:xfrm>
             <a:prstGeom prst="rect">
               <a:avLst/>
@@ -5387,16 +4919,16 @@
                 </a:lnSpc>
               </a:pPr>
               <a:r>
-                <a:rPr lang="en-US" sz="12677">
+                <a:rPr lang="it-IT" sz="12000" b="1" noProof="0" dirty="0">
                   <a:solidFill>
                     <a:srgbClr val="000000"/>
                   </a:solidFill>
-                  <a:latin typeface="Fredoka"/>
+                  <a:latin typeface="Goudy" panose="020B0604020202020204" charset="0"/>
                   <a:ea typeface="Fredoka"/>
                   <a:cs typeface="Fredoka"/>
                   <a:sym typeface="Fredoka"/>
                 </a:rPr>
-                <a:t>PROSSIME ATTIVITÁ</a:t>
+                <a:t>PROSSIME ATTIVITÀ</a:t>
               </a:r>
             </a:p>
           </p:txBody>
@@ -5435,6 +4967,68 @@
           <a:chExt cx="0" cy="0"/>
         </a:xfrm>
       </p:grpSpPr>
+      <p:pic>
+        <p:nvPicPr>
+          <p:cNvPr id="23" name="Picture 3">
+            <a:extLst>
+              <a:ext uri="{FF2B5EF4-FFF2-40B4-BE49-F238E27FC236}">
+                <a16:creationId xmlns:a16="http://schemas.microsoft.com/office/drawing/2014/main" id="{EDFC4036-2EFD-8F9B-FFB4-54D4BAAA3A3E}"/>
+              </a:ext>
+            </a:extLst>
+          </p:cNvPr>
+          <p:cNvPicPr>
+            <a:picLocks noChangeAspect="1"/>
+          </p:cNvPicPr>
+          <p:nvPr/>
+        </p:nvPicPr>
+        <p:blipFill>
+          <a:blip r:embed="rId2"/>
+          <a:srcRect r="64034" b="46739"/>
+          <a:stretch>
+            <a:fillRect/>
+          </a:stretch>
+        </p:blipFill>
+        <p:spPr>
+          <a:xfrm rot="-5400000" flipH="1">
+            <a:off x="796991" y="-796988"/>
+            <a:ext cx="3314701" cy="4908680"/>
+          </a:xfrm>
+          <a:prstGeom prst="rect">
+            <a:avLst/>
+          </a:prstGeom>
+        </p:spPr>
+      </p:pic>
+      <p:pic>
+        <p:nvPicPr>
+          <p:cNvPr id="24" name="Picture 2">
+            <a:extLst>
+              <a:ext uri="{FF2B5EF4-FFF2-40B4-BE49-F238E27FC236}">
+                <a16:creationId xmlns:a16="http://schemas.microsoft.com/office/drawing/2014/main" id="{0D721561-D66A-8ADB-398C-BE4D6021CD57}"/>
+              </a:ext>
+            </a:extLst>
+          </p:cNvPr>
+          <p:cNvPicPr>
+            <a:picLocks noChangeAspect="1"/>
+          </p:cNvPicPr>
+          <p:nvPr/>
+        </p:nvPicPr>
+        <p:blipFill>
+          <a:blip r:embed="rId3"/>
+          <a:srcRect l="62989" t="67035"/>
+          <a:stretch>
+            <a:fillRect/>
+          </a:stretch>
+        </p:blipFill>
+        <p:spPr>
+          <a:xfrm>
+            <a:off x="14955704" y="7197948"/>
+            <a:ext cx="3468258" cy="3089052"/>
+          </a:xfrm>
+          <a:prstGeom prst="rect">
+            <a:avLst/>
+          </a:prstGeom>
+        </p:spPr>
+      </p:pic>
       <p:grpSp>
         <p:nvGrpSpPr>
           <p:cNvPr id="2" name="Group 2"/>
@@ -5444,7 +5038,7 @@
         <p:grpSpPr>
           <a:xfrm>
             <a:off x="464989" y="1977212"/>
-            <a:ext cx="5177943" cy="4981271"/>
+            <a:ext cx="5177943" cy="6747688"/>
             <a:chOff x="0" y="0"/>
             <a:chExt cx="1213495" cy="1167403"/>
           </a:xfrm>
@@ -5492,7 +5086,7 @@
             <a:bodyPr/>
             <a:lstStyle/>
             <a:p>
-              <a:endParaRPr lang="it-IT"/>
+              <a:endParaRPr lang="it-IT" noProof="0" dirty="0"/>
             </a:p>
           </p:txBody>
         </p:sp>
@@ -5520,7 +5114,7 @@
                   <a:spcPts val="2519"/>
                 </a:lnSpc>
               </a:pPr>
-              <a:endParaRPr/>
+              <a:endParaRPr lang="it-IT" noProof="0" dirty="0"/>
             </a:p>
           </p:txBody>
         </p:sp>
@@ -5534,7 +5128,7 @@
         <p:grpSpPr>
           <a:xfrm>
             <a:off x="6557260" y="1977212"/>
-            <a:ext cx="5177943" cy="4981271"/>
+            <a:ext cx="5177943" cy="6747688"/>
             <a:chOff x="0" y="0"/>
             <a:chExt cx="1213495" cy="1167403"/>
           </a:xfrm>
@@ -5582,7 +5176,7 @@
             <a:bodyPr/>
             <a:lstStyle/>
             <a:p>
-              <a:endParaRPr lang="it-IT"/>
+              <a:endParaRPr lang="it-IT" noProof="0" dirty="0"/>
             </a:p>
           </p:txBody>
         </p:sp>
@@ -5610,7 +5204,7 @@
                   <a:spcPts val="2519"/>
                 </a:lnSpc>
               </a:pPr>
-              <a:endParaRPr/>
+              <a:endParaRPr lang="it-IT" noProof="0" dirty="0"/>
             </a:p>
           </p:txBody>
         </p:sp>
@@ -5624,7 +5218,7 @@
         <p:grpSpPr>
           <a:xfrm>
             <a:off x="12645068" y="1977212"/>
-            <a:ext cx="5177943" cy="4981271"/>
+            <a:ext cx="5177943" cy="6747688"/>
             <a:chOff x="0" y="0"/>
             <a:chExt cx="1213495" cy="1167403"/>
           </a:xfrm>
@@ -5672,7 +5266,7 @@
             <a:bodyPr/>
             <a:lstStyle/>
             <a:p>
-              <a:endParaRPr lang="it-IT"/>
+              <a:endParaRPr lang="it-IT" noProof="0" dirty="0"/>
             </a:p>
           </p:txBody>
         </p:sp>
@@ -5700,7 +5294,7 @@
                   <a:spcPts val="2519"/>
                 </a:lnSpc>
               </a:pPr>
-              <a:endParaRPr/>
+              <a:endParaRPr lang="it-IT" noProof="0" dirty="0"/>
             </a:p>
           </p:txBody>
         </p:sp>
@@ -5762,7 +5356,7 @@
             <a:bodyPr/>
             <a:lstStyle/>
             <a:p>
-              <a:endParaRPr lang="it-IT"/>
+              <a:endParaRPr lang="it-IT" noProof="0" dirty="0"/>
             </a:p>
           </p:txBody>
         </p:sp>
@@ -5790,7 +5384,7 @@
                   <a:spcPts val="2520"/>
                 </a:lnSpc>
               </a:pPr>
-              <a:endParaRPr/>
+              <a:endParaRPr lang="it-IT" noProof="0" dirty="0"/>
             </a:p>
           </p:txBody>
         </p:sp>
@@ -5852,7 +5446,7 @@
             <a:bodyPr/>
             <a:lstStyle/>
             <a:p>
-              <a:endParaRPr lang="it-IT"/>
+              <a:endParaRPr lang="it-IT" noProof="0" dirty="0"/>
             </a:p>
           </p:txBody>
         </p:sp>
@@ -5880,7 +5474,7 @@
                   <a:spcPts val="2520"/>
                 </a:lnSpc>
               </a:pPr>
-              <a:endParaRPr/>
+              <a:endParaRPr lang="it-IT" noProof="0" dirty="0"/>
             </a:p>
           </p:txBody>
         </p:sp>
@@ -5942,7 +5536,7 @@
             <a:bodyPr/>
             <a:lstStyle/>
             <a:p>
-              <a:endParaRPr lang="it-IT"/>
+              <a:endParaRPr lang="it-IT" noProof="0" dirty="0"/>
             </a:p>
           </p:txBody>
         </p:sp>
@@ -5970,7 +5564,7 @@
                   <a:spcPts val="2520"/>
                 </a:lnSpc>
               </a:pPr>
-              <a:endParaRPr/>
+              <a:endParaRPr lang="it-IT" noProof="0" dirty="0"/>
             </a:p>
           </p:txBody>
         </p:sp>
@@ -5983,8 +5577,8 @@
         </p:nvSpPr>
         <p:spPr>
           <a:xfrm>
-            <a:off x="7157367" y="2867632"/>
-            <a:ext cx="3977729" cy="3681714"/>
+            <a:off x="7155133" y="2344330"/>
+            <a:ext cx="3977729" cy="1732847"/>
           </a:xfrm>
           <a:prstGeom prst="rect">
             <a:avLst/>
@@ -6002,7 +5596,7 @@
               </a:lnSpc>
             </a:pPr>
             <a:r>
-              <a:rPr lang="en-US" sz="2022" b="1" i="1" dirty="0" err="1">
+              <a:rPr lang="it-IT" sz="2600" b="1" i="1" noProof="0" dirty="0">
                 <a:solidFill>
                   <a:srgbClr val="000000"/>
                 </a:solidFill>
@@ -6011,10 +5605,135 @@
                 <a:cs typeface="Montserrat Bold Italics"/>
                 <a:sym typeface="Montserrat Bold Italics"/>
               </a:rPr>
-              <a:t>Dubbi</a:t>
-            </a:r>
-            <a:r>
-              <a:rPr lang="en-US" sz="2022" b="1" i="1" dirty="0">
+              <a:t>Dubbi su come procedere: </a:t>
+            </a:r>
+          </a:p>
+          <a:p>
+            <a:pPr algn="ctr">
+              <a:lnSpc>
+                <a:spcPct val="150000"/>
+              </a:lnSpc>
+            </a:pPr>
+            <a:endParaRPr lang="it-IT" sz="2600" noProof="0" dirty="0">
+              <a:solidFill>
+                <a:srgbClr val="000000"/>
+              </a:solidFill>
+              <a:latin typeface="Montserrat"/>
+              <a:ea typeface="Montserrat"/>
+              <a:cs typeface="Montserrat"/>
+              <a:sym typeface="Montserrat"/>
+            </a:endParaRPr>
+          </a:p>
+        </p:txBody>
+      </p:sp>
+      <p:sp>
+        <p:nvSpPr>
+          <p:cNvPr id="21" name="TextBox 21"/>
+          <p:cNvSpPr txBox="1"/>
+          <p:nvPr/>
+        </p:nvSpPr>
+        <p:spPr>
+          <a:xfrm>
+            <a:off x="983237" y="3771900"/>
+            <a:ext cx="3977729" cy="2933175"/>
+          </a:xfrm>
+          <a:prstGeom prst="rect">
+            <a:avLst/>
+          </a:prstGeom>
+        </p:spPr>
+        <p:txBody>
+          <a:bodyPr lIns="0" tIns="0" rIns="0" bIns="0" rtlCol="0" anchor="t">
+            <a:spAutoFit/>
+          </a:bodyPr>
+          <a:lstStyle/>
+          <a:p>
+            <a:pPr marL="436733" lvl="1" indent="-218366" algn="l">
+              <a:lnSpc>
+                <a:spcPct val="150000"/>
+              </a:lnSpc>
+              <a:buFont typeface="Arial"/>
+              <a:buChar char="•"/>
+            </a:pPr>
+            <a:r>
+              <a:rPr lang="it-IT" sz="2600" noProof="0" dirty="0">
+                <a:solidFill>
+                  <a:srgbClr val="000000"/>
+                </a:solidFill>
+                <a:latin typeface="Overpass" panose="020B0604020202020204" charset="0"/>
+                <a:ea typeface="Montserrat"/>
+                <a:cs typeface="Montserrat"/>
+                <a:sym typeface="Montserrat"/>
+              </a:rPr>
+              <a:t>Difficoltà nel valutare la complessità reale</a:t>
+            </a:r>
+          </a:p>
+          <a:p>
+            <a:pPr marL="436733" lvl="1" indent="-218366" algn="l">
+              <a:lnSpc>
+                <a:spcPct val="150000"/>
+              </a:lnSpc>
+              <a:buFont typeface="Arial"/>
+              <a:buChar char="•"/>
+            </a:pPr>
+            <a:r>
+              <a:rPr lang="it-IT" sz="2600" noProof="0" dirty="0">
+                <a:solidFill>
+                  <a:srgbClr val="000000"/>
+                </a:solidFill>
+                <a:latin typeface="Overpass" panose="020B0604020202020204" charset="0"/>
+                <a:ea typeface="Montserrat"/>
+                <a:cs typeface="Montserrat"/>
+                <a:sym typeface="Montserrat"/>
+              </a:rPr>
+              <a:t>Gestione impegni universitari vs progetto</a:t>
+            </a:r>
+          </a:p>
+          <a:p>
+            <a:pPr algn="ctr">
+              <a:lnSpc>
+                <a:spcPct val="150000"/>
+              </a:lnSpc>
+            </a:pPr>
+            <a:endParaRPr lang="it-IT" sz="2600" noProof="0" dirty="0">
+              <a:solidFill>
+                <a:srgbClr val="000000"/>
+              </a:solidFill>
+              <a:latin typeface="Montserrat"/>
+              <a:ea typeface="Montserrat"/>
+              <a:cs typeface="Montserrat"/>
+              <a:sym typeface="Montserrat"/>
+            </a:endParaRPr>
+          </a:p>
+        </p:txBody>
+      </p:sp>
+      <p:sp>
+        <p:nvSpPr>
+          <p:cNvPr id="22" name="TextBox 22"/>
+          <p:cNvSpPr txBox="1"/>
+          <p:nvPr/>
+        </p:nvSpPr>
+        <p:spPr>
+          <a:xfrm>
+            <a:off x="13245174" y="2344330"/>
+            <a:ext cx="3977729" cy="532518"/>
+          </a:xfrm>
+          <a:prstGeom prst="rect">
+            <a:avLst/>
+          </a:prstGeom>
+        </p:spPr>
+        <p:txBody>
+          <a:bodyPr lIns="0" tIns="0" rIns="0" bIns="0" rtlCol="0" anchor="t">
+            <a:spAutoFit/>
+          </a:bodyPr>
+          <a:lstStyle/>
+          <a:p>
+            <a:pPr algn="ctr">
+              <a:lnSpc>
+                <a:spcPct val="150000"/>
+              </a:lnSpc>
+            </a:pPr>
+            <a:r>
+              <a:rPr lang="it-IT" sz="2600" b="1" i="1" noProof="0" dirty="0">
                 <a:solidFill>
                   <a:srgbClr val="000000"/>
                 </a:solidFill>
@@ -6023,57 +5742,84 @@
                 <a:cs typeface="Montserrat Bold Italics"/>
                 <a:sym typeface="Montserrat Bold Italics"/>
               </a:rPr>
-              <a:t> </a:t>
-            </a:r>
-            <a:r>
-              <a:rPr lang="en-US" sz="2022" b="1" i="1" dirty="0" err="1">
+              <a:t>Idee da condividere: </a:t>
+            </a:r>
+          </a:p>
+        </p:txBody>
+      </p:sp>
+      <p:sp>
+        <p:nvSpPr>
+          <p:cNvPr id="26" name="CasellaDiTesto 25">
+            <a:extLst>
+              <a:ext uri="{FF2B5EF4-FFF2-40B4-BE49-F238E27FC236}">
+                <a16:creationId xmlns:a16="http://schemas.microsoft.com/office/drawing/2014/main" id="{3D39454E-9071-55EE-5A3F-07C3D1EE76F0}"/>
+              </a:ext>
+            </a:extLst>
+          </p:cNvPr>
+          <p:cNvSpPr txBox="1"/>
+          <p:nvPr/>
+        </p:nvSpPr>
+        <p:spPr>
+          <a:xfrm>
+            <a:off x="1117075" y="2344330"/>
+            <a:ext cx="3925749" cy="624851"/>
+          </a:xfrm>
+          <a:prstGeom prst="rect">
+            <a:avLst/>
+          </a:prstGeom>
+          <a:noFill/>
+        </p:spPr>
+        <p:txBody>
+          <a:bodyPr wrap="square">
+            <a:spAutoFit/>
+          </a:bodyPr>
+          <a:lstStyle/>
+          <a:p>
+            <a:pPr algn="ctr">
+              <a:lnSpc>
+                <a:spcPct val="150000"/>
+              </a:lnSpc>
+            </a:pPr>
+            <a:r>
+              <a:rPr lang="it-IT" sz="2600" b="1" i="1" dirty="0">
                 <a:solidFill>
                   <a:srgbClr val="000000"/>
                 </a:solidFill>
                 <a:latin typeface="Montserrat Bold Italics"/>
-                <a:ea typeface="Montserrat Bold Italics"/>
-                <a:cs typeface="Montserrat Bold Italics"/>
                 <a:sym typeface="Montserrat Bold Italics"/>
               </a:rPr>
-              <a:t>su</a:t>
-            </a:r>
-            <a:r>
-              <a:rPr lang="en-US" sz="2022" b="1" i="1" dirty="0">
-                <a:solidFill>
-                  <a:srgbClr val="000000"/>
-                </a:solidFill>
-                <a:latin typeface="Montserrat Bold Italics"/>
-                <a:ea typeface="Montserrat Bold Italics"/>
-                <a:cs typeface="Montserrat Bold Italics"/>
-                <a:sym typeface="Montserrat Bold Italics"/>
-              </a:rPr>
-              <a:t> come </a:t>
-            </a:r>
-            <a:r>
-              <a:rPr lang="en-US" sz="2022" b="1" i="1" dirty="0" err="1">
-                <a:solidFill>
-                  <a:srgbClr val="000000"/>
-                </a:solidFill>
-                <a:latin typeface="Montserrat Bold Italics"/>
-                <a:ea typeface="Montserrat Bold Italics"/>
-                <a:cs typeface="Montserrat Bold Italics"/>
-                <a:sym typeface="Montserrat Bold Italics"/>
-              </a:rPr>
-              <a:t>procedere</a:t>
-            </a:r>
-            <a:r>
-              <a:rPr lang="en-US" sz="2022" b="1" i="1" dirty="0">
-                <a:solidFill>
-                  <a:srgbClr val="000000"/>
-                </a:solidFill>
-                <a:latin typeface="Montserrat Bold Italics"/>
-                <a:ea typeface="Montserrat Bold Italics"/>
-                <a:cs typeface="Montserrat Bold Italics"/>
-                <a:sym typeface="Montserrat Bold Italics"/>
-              </a:rPr>
-              <a:t>: </a:t>
-            </a:r>
-          </a:p>
+              <a:t>Difficoltà incontrate: </a:t>
+            </a:r>
+          </a:p>
+        </p:txBody>
+      </p:sp>
+      <p:sp>
+        <p:nvSpPr>
+          <p:cNvPr id="28" name="CasellaDiTesto 27">
+            <a:extLst>
+              <a:ext uri="{FF2B5EF4-FFF2-40B4-BE49-F238E27FC236}">
+                <a16:creationId xmlns:a16="http://schemas.microsoft.com/office/drawing/2014/main" id="{D102C9FF-0005-4966-C9CC-73A9118FFADD}"/>
+              </a:ext>
+            </a:extLst>
+          </p:cNvPr>
+          <p:cNvSpPr txBox="1"/>
+          <p:nvPr/>
+        </p:nvSpPr>
+        <p:spPr>
+          <a:xfrm>
+            <a:off x="6691516" y="3766930"/>
+            <a:ext cx="4904961" cy="1821781"/>
+          </a:xfrm>
+          <a:prstGeom prst="rect">
+            <a:avLst/>
+          </a:prstGeom>
+          <a:noFill/>
+        </p:spPr>
+        <p:txBody>
+          <a:bodyPr wrap="square">
+            <a:spAutoFit/>
+          </a:bodyPr>
+          <a:lstStyle/>
           <a:p>
             <a:pPr marL="436733" lvl="1" indent="-218366" algn="l">
               <a:lnSpc>
@@ -6083,136 +5829,14 @@
               <a:buChar char="•"/>
             </a:pPr>
             <a:r>
-              <a:rPr lang="en-US" sz="2022" dirty="0">
+              <a:rPr lang="it-IT" sz="2600" dirty="0">
                 <a:solidFill>
                   <a:srgbClr val="000000"/>
                 </a:solidFill>
-                <a:latin typeface="Montserrat"/>
-                <a:ea typeface="Montserrat"/>
-                <a:cs typeface="Montserrat"/>
+                <a:latin typeface="Overpass" panose="020B0604020202020204" charset="0"/>
                 <a:sym typeface="Montserrat"/>
               </a:rPr>
-              <a:t>Quanto </a:t>
-            </a:r>
-            <a:r>
-              <a:rPr lang="en-US" sz="2022" dirty="0" err="1">
-                <a:solidFill>
-                  <a:srgbClr val="000000"/>
-                </a:solidFill>
-                <a:latin typeface="Montserrat"/>
-                <a:ea typeface="Montserrat"/>
-                <a:cs typeface="Montserrat"/>
-                <a:sym typeface="Montserrat"/>
-              </a:rPr>
-              <a:t>possiamo</a:t>
-            </a:r>
-            <a:r>
-              <a:rPr lang="en-US" sz="2022" dirty="0">
-                <a:solidFill>
-                  <a:srgbClr val="000000"/>
-                </a:solidFill>
-                <a:latin typeface="Montserrat"/>
-                <a:ea typeface="Montserrat"/>
-                <a:cs typeface="Montserrat"/>
-                <a:sym typeface="Montserrat"/>
-              </a:rPr>
-              <a:t> </a:t>
-            </a:r>
-            <a:r>
-              <a:rPr lang="en-US" sz="2022" dirty="0" err="1">
-                <a:solidFill>
-                  <a:srgbClr val="000000"/>
-                </a:solidFill>
-                <a:latin typeface="Montserrat"/>
-                <a:ea typeface="Montserrat"/>
-                <a:cs typeface="Montserrat"/>
-                <a:sym typeface="Montserrat"/>
-              </a:rPr>
-              <a:t>negoziare</a:t>
-            </a:r>
-            <a:r>
-              <a:rPr lang="en-US" sz="2022" dirty="0">
-                <a:solidFill>
-                  <a:srgbClr val="000000"/>
-                </a:solidFill>
-                <a:latin typeface="Montserrat"/>
-                <a:ea typeface="Montserrat"/>
-                <a:cs typeface="Montserrat"/>
-                <a:sym typeface="Montserrat"/>
-              </a:rPr>
-              <a:t> </a:t>
-            </a:r>
-            <a:r>
-              <a:rPr lang="en-US" sz="2022" dirty="0" err="1">
-                <a:solidFill>
-                  <a:srgbClr val="000000"/>
-                </a:solidFill>
-                <a:latin typeface="Montserrat"/>
-                <a:ea typeface="Montserrat"/>
-                <a:cs typeface="Montserrat"/>
-                <a:sym typeface="Montserrat"/>
-              </a:rPr>
-              <a:t>i</a:t>
-            </a:r>
-            <a:r>
-              <a:rPr lang="en-US" sz="2022" dirty="0">
-                <a:solidFill>
-                  <a:srgbClr val="000000"/>
-                </a:solidFill>
-                <a:latin typeface="Montserrat"/>
-                <a:ea typeface="Montserrat"/>
-                <a:cs typeface="Montserrat"/>
-                <a:sym typeface="Montserrat"/>
-              </a:rPr>
-              <a:t> </a:t>
-            </a:r>
-            <a:r>
-              <a:rPr lang="en-US" sz="2022" dirty="0" err="1">
-                <a:solidFill>
-                  <a:srgbClr val="000000"/>
-                </a:solidFill>
-                <a:latin typeface="Montserrat"/>
-                <a:ea typeface="Montserrat"/>
-                <a:cs typeface="Montserrat"/>
-                <a:sym typeface="Montserrat"/>
-              </a:rPr>
-              <a:t>requisiti</a:t>
-            </a:r>
-            <a:r>
-              <a:rPr lang="en-US" sz="2022" dirty="0">
-                <a:solidFill>
-                  <a:srgbClr val="000000"/>
-                </a:solidFill>
-                <a:latin typeface="Montserrat"/>
-                <a:ea typeface="Montserrat"/>
-                <a:cs typeface="Montserrat"/>
-                <a:sym typeface="Montserrat"/>
-              </a:rPr>
-              <a:t> con </a:t>
-            </a:r>
-            <a:r>
-              <a:rPr lang="en-US" sz="2022" dirty="0" err="1">
-                <a:solidFill>
-                  <a:srgbClr val="000000"/>
-                </a:solidFill>
-                <a:latin typeface="Montserrat"/>
-                <a:ea typeface="Montserrat"/>
-                <a:cs typeface="Montserrat"/>
-                <a:sym typeface="Montserrat"/>
-              </a:rPr>
-              <a:t>l’Azienda</a:t>
-            </a:r>
-            <a:r>
-              <a:rPr lang="en-US" sz="2022" dirty="0">
-                <a:solidFill>
-                  <a:srgbClr val="000000"/>
-                </a:solidFill>
-                <a:latin typeface="Montserrat"/>
-                <a:ea typeface="Montserrat"/>
-                <a:cs typeface="Montserrat"/>
-                <a:sym typeface="Montserrat"/>
-              </a:rPr>
-              <a:t>?</a:t>
+              <a:t>Come gestire gli incontri con le aziende efficacemente?</a:t>
             </a:r>
           </a:p>
           <a:p>
@@ -6223,152 +5847,11 @@
               <a:buFont typeface="Arial"/>
               <a:buChar char="•"/>
             </a:pPr>
-            <a:r>
-              <a:rPr lang="en-US" sz="2022" dirty="0">
-                <a:solidFill>
-                  <a:srgbClr val="000000"/>
-                </a:solidFill>
-                <a:latin typeface="Montserrat"/>
-                <a:ea typeface="Montserrat"/>
-                <a:cs typeface="Montserrat"/>
-                <a:sym typeface="Montserrat"/>
-              </a:rPr>
-              <a:t>Come </a:t>
-            </a:r>
-            <a:r>
-              <a:rPr lang="en-US" sz="2022" dirty="0" err="1">
-                <a:solidFill>
-                  <a:srgbClr val="000000"/>
-                </a:solidFill>
-                <a:latin typeface="Montserrat"/>
-                <a:ea typeface="Montserrat"/>
-                <a:cs typeface="Montserrat"/>
-                <a:sym typeface="Montserrat"/>
-              </a:rPr>
-              <a:t>gestire</a:t>
-            </a:r>
-            <a:r>
-              <a:rPr lang="en-US" sz="2022" dirty="0">
-                <a:solidFill>
-                  <a:srgbClr val="000000"/>
-                </a:solidFill>
-                <a:latin typeface="Montserrat"/>
-                <a:ea typeface="Montserrat"/>
-                <a:cs typeface="Montserrat"/>
-                <a:sym typeface="Montserrat"/>
-              </a:rPr>
-              <a:t> </a:t>
-            </a:r>
-            <a:r>
-              <a:rPr lang="en-US" sz="2022" dirty="0" err="1">
-                <a:solidFill>
-                  <a:srgbClr val="000000"/>
-                </a:solidFill>
-                <a:latin typeface="Montserrat"/>
-                <a:ea typeface="Montserrat"/>
-                <a:cs typeface="Montserrat"/>
-                <a:sym typeface="Montserrat"/>
-              </a:rPr>
-              <a:t>gli</a:t>
-            </a:r>
-            <a:r>
-              <a:rPr lang="en-US" sz="2022" dirty="0">
-                <a:solidFill>
-                  <a:srgbClr val="000000"/>
-                </a:solidFill>
-                <a:latin typeface="Montserrat"/>
-                <a:ea typeface="Montserrat"/>
-                <a:cs typeface="Montserrat"/>
-                <a:sym typeface="Montserrat"/>
-              </a:rPr>
-              <a:t> </a:t>
-            </a:r>
-            <a:r>
-              <a:rPr lang="en-US" sz="2022" dirty="0" err="1">
-                <a:solidFill>
-                  <a:srgbClr val="000000"/>
-                </a:solidFill>
-                <a:latin typeface="Montserrat"/>
-                <a:ea typeface="Montserrat"/>
-                <a:cs typeface="Montserrat"/>
-                <a:sym typeface="Montserrat"/>
-              </a:rPr>
-              <a:t>incontri</a:t>
-            </a:r>
-            <a:r>
-              <a:rPr lang="en-US" sz="2022" dirty="0">
-                <a:solidFill>
-                  <a:srgbClr val="000000"/>
-                </a:solidFill>
-                <a:latin typeface="Montserrat"/>
-                <a:ea typeface="Montserrat"/>
-                <a:cs typeface="Montserrat"/>
-                <a:sym typeface="Montserrat"/>
-              </a:rPr>
-              <a:t> con le </a:t>
-            </a:r>
-            <a:r>
-              <a:rPr lang="en-US" sz="2022" dirty="0" err="1">
-                <a:solidFill>
-                  <a:srgbClr val="000000"/>
-                </a:solidFill>
-                <a:latin typeface="Montserrat"/>
-                <a:ea typeface="Montserrat"/>
-                <a:cs typeface="Montserrat"/>
-                <a:sym typeface="Montserrat"/>
-              </a:rPr>
-              <a:t>aziende</a:t>
-            </a:r>
-            <a:r>
-              <a:rPr lang="en-US" sz="2022" dirty="0">
-                <a:solidFill>
-                  <a:srgbClr val="000000"/>
-                </a:solidFill>
-                <a:latin typeface="Montserrat"/>
-                <a:ea typeface="Montserrat"/>
-                <a:cs typeface="Montserrat"/>
-                <a:sym typeface="Montserrat"/>
-              </a:rPr>
-              <a:t> </a:t>
-            </a:r>
-            <a:r>
-              <a:rPr lang="en-US" sz="2022" dirty="0" err="1">
-                <a:solidFill>
-                  <a:srgbClr val="000000"/>
-                </a:solidFill>
-                <a:latin typeface="Montserrat"/>
-                <a:ea typeface="Montserrat"/>
-                <a:cs typeface="Montserrat"/>
-                <a:sym typeface="Montserrat"/>
-              </a:rPr>
-              <a:t>efficacemente</a:t>
-            </a:r>
-            <a:r>
-              <a:rPr lang="en-US" sz="2022" dirty="0">
-                <a:solidFill>
-                  <a:srgbClr val="000000"/>
-                </a:solidFill>
-                <a:latin typeface="Montserrat"/>
-                <a:ea typeface="Montserrat"/>
-                <a:cs typeface="Montserrat"/>
-                <a:sym typeface="Montserrat"/>
-              </a:rPr>
-              <a:t>?</a:t>
-            </a:r>
-          </a:p>
-          <a:p>
-            <a:pPr algn="ctr">
-              <a:lnSpc>
-                <a:spcPct val="150000"/>
-              </a:lnSpc>
-            </a:pPr>
-            <a:endParaRPr lang="en-US" sz="2022" dirty="0">
+            <a:endParaRPr lang="it-IT" sz="2600" dirty="0">
               <a:solidFill>
                 <a:srgbClr val="000000"/>
               </a:solidFill>
-              <a:latin typeface="Montserrat"/>
-              <a:ea typeface="Montserrat"/>
-              <a:cs typeface="Montserrat"/>
+              <a:latin typeface="Overpass" panose="020B0604020202020204" charset="0"/>
               <a:sym typeface="Montserrat"/>
             </a:endParaRPr>
           </a:p>
@@ -6376,79 +5859,31 @@
       </p:sp>
       <p:sp>
         <p:nvSpPr>
-          <p:cNvPr id="21" name="TextBox 21"/>
+          <p:cNvPr id="30" name="CasellaDiTesto 29">
+            <a:extLst>
+              <a:ext uri="{FF2B5EF4-FFF2-40B4-BE49-F238E27FC236}">
+                <a16:creationId xmlns:a16="http://schemas.microsoft.com/office/drawing/2014/main" id="{3E2694B7-8DFD-79C9-9AB3-43D576A959DE}"/>
+              </a:ext>
+            </a:extLst>
+          </p:cNvPr>
           <p:cNvSpPr txBox="1"/>
           <p:nvPr/>
         </p:nvSpPr>
         <p:spPr>
           <a:xfrm>
-            <a:off x="1065096" y="2867632"/>
-            <a:ext cx="3977729" cy="2748125"/>
+            <a:off x="12800132" y="3766930"/>
+            <a:ext cx="4867811" cy="4222438"/>
           </a:xfrm>
           <a:prstGeom prst="rect">
             <a:avLst/>
           </a:prstGeom>
+          <a:noFill/>
         </p:spPr>
         <p:txBody>
-          <a:bodyPr lIns="0" tIns="0" rIns="0" bIns="0" rtlCol="0" anchor="t">
+          <a:bodyPr wrap="square">
             <a:spAutoFit/>
           </a:bodyPr>
           <a:lstStyle/>
-          <a:p>
-            <a:pPr algn="ctr">
-              <a:lnSpc>
-                <a:spcPct val="150000"/>
-              </a:lnSpc>
-            </a:pPr>
-            <a:r>
-              <a:rPr lang="en-US" sz="2022" b="1" i="1" dirty="0" err="1">
-                <a:solidFill>
-                  <a:srgbClr val="000000"/>
-                </a:solidFill>
-                <a:latin typeface="Montserrat Bold Italics"/>
-                <a:ea typeface="Montserrat Bold Italics"/>
-                <a:cs typeface="Montserrat Bold Italics"/>
-                <a:sym typeface="Montserrat Bold Italics"/>
-              </a:rPr>
-              <a:t>Difficoltà</a:t>
-            </a:r>
-            <a:r>
-              <a:rPr lang="en-US" sz="2022" b="1" i="1" dirty="0">
-                <a:solidFill>
-                  <a:srgbClr val="000000"/>
-                </a:solidFill>
-                <a:latin typeface="Montserrat Bold Italics"/>
-                <a:ea typeface="Montserrat Bold Italics"/>
-                <a:cs typeface="Montserrat Bold Italics"/>
-                <a:sym typeface="Montserrat Bold Italics"/>
-              </a:rPr>
-              <a:t> </a:t>
-            </a:r>
-            <a:r>
-              <a:rPr lang="en-US" sz="2022" b="1" i="1" dirty="0" err="1">
-                <a:solidFill>
-                  <a:srgbClr val="000000"/>
-                </a:solidFill>
-                <a:latin typeface="Montserrat Bold Italics"/>
-                <a:ea typeface="Montserrat Bold Italics"/>
-                <a:cs typeface="Montserrat Bold Italics"/>
-                <a:sym typeface="Montserrat Bold Italics"/>
-              </a:rPr>
-              <a:t>incontrate</a:t>
-            </a:r>
-            <a:r>
-              <a:rPr lang="en-US" sz="2022" b="1" i="1" dirty="0">
-                <a:solidFill>
-                  <a:srgbClr val="000000"/>
-                </a:solidFill>
-                <a:latin typeface="Montserrat Bold Italics"/>
-                <a:ea typeface="Montserrat Bold Italics"/>
-                <a:cs typeface="Montserrat Bold Italics"/>
-                <a:sym typeface="Montserrat Bold Italics"/>
-              </a:rPr>
-              <a:t>: </a:t>
-            </a:r>
-          </a:p>
           <a:p>
             <a:pPr marL="436733" lvl="1" indent="-218366" algn="l">
               <a:lnSpc>
@@ -6458,122 +5893,15 @@
               <a:buChar char="•"/>
             </a:pPr>
             <a:r>
-              <a:rPr lang="en-US" sz="2022" dirty="0" err="1">
+              <a:rPr lang="it-IT" sz="2600" dirty="0">
                 <a:solidFill>
                   <a:srgbClr val="000000"/>
                 </a:solidFill>
-                <a:latin typeface="Montserrat"/>
-                <a:ea typeface="Montserrat"/>
-                <a:cs typeface="Montserrat"/>
+                <a:latin typeface="Overpass" panose="020B0604020202020204" charset="0"/>
                 <a:sym typeface="Montserrat"/>
               </a:rPr>
-              <a:t>Difficoltà</a:t>
-            </a:r>
-            <a:r>
-              <a:rPr lang="en-US" sz="2022" dirty="0">
-                <a:solidFill>
-                  <a:srgbClr val="000000"/>
-                </a:solidFill>
-                <a:latin typeface="Montserrat"/>
-                <a:ea typeface="Montserrat"/>
-                <a:cs typeface="Montserrat"/>
-                <a:sym typeface="Montserrat"/>
-              </a:rPr>
-              <a:t> </a:t>
-            </a:r>
-            <a:r>
-              <a:rPr lang="en-US" sz="2022" dirty="0" err="1">
-                <a:solidFill>
-                  <a:srgbClr val="000000"/>
-                </a:solidFill>
-                <a:latin typeface="Montserrat"/>
-                <a:ea typeface="Montserrat"/>
-                <a:cs typeface="Montserrat"/>
-                <a:sym typeface="Montserrat"/>
-              </a:rPr>
-              <a:t>nel</a:t>
-            </a:r>
-            <a:r>
-              <a:rPr lang="en-US" sz="2022" dirty="0">
-                <a:solidFill>
-                  <a:srgbClr val="000000"/>
-                </a:solidFill>
-                <a:latin typeface="Montserrat"/>
-                <a:ea typeface="Montserrat"/>
-                <a:cs typeface="Montserrat"/>
-                <a:sym typeface="Montserrat"/>
-              </a:rPr>
-              <a:t> </a:t>
-            </a:r>
-            <a:r>
-              <a:rPr lang="en-US" sz="2022" dirty="0" err="1">
-                <a:solidFill>
-                  <a:srgbClr val="000000"/>
-                </a:solidFill>
-                <a:latin typeface="Montserrat"/>
-                <a:ea typeface="Montserrat"/>
-                <a:cs typeface="Montserrat"/>
-                <a:sym typeface="Montserrat"/>
-              </a:rPr>
-              <a:t>valutare</a:t>
-            </a:r>
-            <a:r>
-              <a:rPr lang="en-US" sz="2022" dirty="0">
-                <a:solidFill>
-                  <a:srgbClr val="000000"/>
-                </a:solidFill>
-                <a:latin typeface="Montserrat"/>
-                <a:ea typeface="Montserrat"/>
-                <a:cs typeface="Montserrat"/>
-                <a:sym typeface="Montserrat"/>
-              </a:rPr>
-              <a:t> </a:t>
-            </a:r>
-            <a:r>
-              <a:rPr lang="en-US" sz="2022" dirty="0" err="1">
-                <a:solidFill>
-                  <a:srgbClr val="000000"/>
-                </a:solidFill>
-                <a:latin typeface="Montserrat"/>
-                <a:ea typeface="Montserrat"/>
-                <a:cs typeface="Montserrat"/>
-                <a:sym typeface="Montserrat"/>
-              </a:rPr>
-              <a:t>complessità</a:t>
-            </a:r>
-            <a:r>
-              <a:rPr lang="en-US" sz="2022" dirty="0">
-                <a:solidFill>
-                  <a:srgbClr val="000000"/>
-                </a:solidFill>
-                <a:latin typeface="Montserrat"/>
-                <a:ea typeface="Montserrat"/>
-                <a:cs typeface="Montserrat"/>
-                <a:sym typeface="Montserrat"/>
-              </a:rPr>
-              <a:t> </a:t>
-            </a:r>
-            <a:r>
-              <a:rPr lang="en-US" sz="2022" dirty="0" err="1">
-                <a:solidFill>
-                  <a:srgbClr val="000000"/>
-                </a:solidFill>
-                <a:latin typeface="Montserrat"/>
-                <a:ea typeface="Montserrat"/>
-                <a:cs typeface="Montserrat"/>
-                <a:sym typeface="Montserrat"/>
-              </a:rPr>
-              <a:t>reale</a:t>
-            </a:r>
-            <a:endParaRPr lang="en-US" sz="2022" dirty="0">
-              <a:solidFill>
-                <a:srgbClr val="000000"/>
-              </a:solidFill>
-              <a:latin typeface="Montserrat"/>
-              <a:ea typeface="Montserrat"/>
-              <a:cs typeface="Montserrat"/>
-              <a:sym typeface="Montserrat"/>
-            </a:endParaRPr>
+              <a:t>Template standard per documentazione</a:t>
+            </a:r>
           </a:p>
           <a:p>
             <a:pPr marL="436733" lvl="1" indent="-218366" algn="l">
@@ -6584,178 +5912,14 @@
               <a:buChar char="•"/>
             </a:pPr>
             <a:r>
-              <a:rPr lang="en-US" sz="2022" dirty="0" err="1">
+              <a:rPr lang="it-IT" sz="2600" dirty="0">
                 <a:solidFill>
                   <a:srgbClr val="000000"/>
                 </a:solidFill>
-                <a:latin typeface="Montserrat"/>
-                <a:ea typeface="Montserrat"/>
-                <a:cs typeface="Montserrat"/>
-                <a:sym typeface="Montserrat"/>
+                <a:latin typeface="Overpass" panose="020B0604020202020204" charset="0"/>
+                <a:sym typeface="Montserrat Italics"/>
               </a:rPr>
-              <a:t>Gestione</a:t>
-            </a:r>
-            <a:r>
-              <a:rPr lang="en-US" sz="2022" dirty="0">
-                <a:solidFill>
-                  <a:srgbClr val="000000"/>
-                </a:solidFill>
-                <a:latin typeface="Montserrat"/>
-                <a:ea typeface="Montserrat"/>
-                <a:cs typeface="Montserrat"/>
-                <a:sym typeface="Montserrat"/>
-              </a:rPr>
-              <a:t> </a:t>
-            </a:r>
-            <a:r>
-              <a:rPr lang="en-US" sz="2022" dirty="0" err="1">
-                <a:solidFill>
-                  <a:srgbClr val="000000"/>
-                </a:solidFill>
-                <a:latin typeface="Montserrat"/>
-                <a:ea typeface="Montserrat"/>
-                <a:cs typeface="Montserrat"/>
-                <a:sym typeface="Montserrat"/>
-              </a:rPr>
-              <a:t>impegni</a:t>
-            </a:r>
-            <a:r>
-              <a:rPr lang="en-US" sz="2022" dirty="0">
-                <a:solidFill>
-                  <a:srgbClr val="000000"/>
-                </a:solidFill>
-                <a:latin typeface="Montserrat"/>
-                <a:ea typeface="Montserrat"/>
-                <a:cs typeface="Montserrat"/>
-                <a:sym typeface="Montserrat"/>
-              </a:rPr>
-              <a:t> </a:t>
-            </a:r>
-            <a:r>
-              <a:rPr lang="en-US" sz="2022" dirty="0" err="1">
-                <a:solidFill>
-                  <a:srgbClr val="000000"/>
-                </a:solidFill>
-                <a:latin typeface="Montserrat"/>
-                <a:ea typeface="Montserrat"/>
-                <a:cs typeface="Montserrat"/>
-                <a:sym typeface="Montserrat"/>
-              </a:rPr>
-              <a:t>universitari</a:t>
-            </a:r>
-            <a:r>
-              <a:rPr lang="en-US" sz="2022" dirty="0">
-                <a:solidFill>
-                  <a:srgbClr val="000000"/>
-                </a:solidFill>
-                <a:latin typeface="Montserrat"/>
-                <a:ea typeface="Montserrat"/>
-                <a:cs typeface="Montserrat"/>
-                <a:sym typeface="Montserrat"/>
-              </a:rPr>
-              <a:t> vs </a:t>
-            </a:r>
-            <a:r>
-              <a:rPr lang="en-US" sz="2022" dirty="0" err="1">
-                <a:solidFill>
-                  <a:srgbClr val="000000"/>
-                </a:solidFill>
-                <a:latin typeface="Montserrat"/>
-                <a:ea typeface="Montserrat"/>
-                <a:cs typeface="Montserrat"/>
-                <a:sym typeface="Montserrat"/>
-              </a:rPr>
-              <a:t>progetto</a:t>
-            </a:r>
-            <a:endParaRPr lang="en-US" sz="2022" dirty="0">
-              <a:solidFill>
-                <a:srgbClr val="000000"/>
-              </a:solidFill>
-              <a:latin typeface="Montserrat"/>
-              <a:ea typeface="Montserrat"/>
-              <a:cs typeface="Montserrat"/>
-              <a:sym typeface="Montserrat"/>
-            </a:endParaRPr>
-          </a:p>
-          <a:p>
-            <a:pPr algn="ctr">
-              <a:lnSpc>
-                <a:spcPct val="150000"/>
-              </a:lnSpc>
-            </a:pPr>
-            <a:endParaRPr lang="en-US" sz="2022" dirty="0">
-              <a:solidFill>
-                <a:srgbClr val="000000"/>
-              </a:solidFill>
-              <a:latin typeface="Montserrat"/>
-              <a:ea typeface="Montserrat"/>
-              <a:cs typeface="Montserrat"/>
-              <a:sym typeface="Montserrat"/>
-            </a:endParaRPr>
-          </a:p>
-        </p:txBody>
-      </p:sp>
-      <p:sp>
-        <p:nvSpPr>
-          <p:cNvPr id="22" name="TextBox 22"/>
-          <p:cNvSpPr txBox="1"/>
-          <p:nvPr/>
-        </p:nvSpPr>
-        <p:spPr>
-          <a:xfrm>
-            <a:off x="13245175" y="2867632"/>
-            <a:ext cx="3977729" cy="3681714"/>
-          </a:xfrm>
-          <a:prstGeom prst="rect">
-            <a:avLst/>
-          </a:prstGeom>
-        </p:spPr>
-        <p:txBody>
-          <a:bodyPr lIns="0" tIns="0" rIns="0" bIns="0" rtlCol="0" anchor="t">
-            <a:spAutoFit/>
-          </a:bodyPr>
-          <a:lstStyle/>
-          <a:p>
-            <a:pPr algn="ctr">
-              <a:lnSpc>
-                <a:spcPct val="150000"/>
-              </a:lnSpc>
-            </a:pPr>
-            <a:r>
-              <a:rPr lang="en-US" sz="2022" b="1" i="1" dirty="0">
-                <a:solidFill>
-                  <a:srgbClr val="000000"/>
-                </a:solidFill>
-                <a:latin typeface="Montserrat Bold Italics"/>
-                <a:ea typeface="Montserrat Bold Italics"/>
-                <a:cs typeface="Montserrat Bold Italics"/>
-                <a:sym typeface="Montserrat Bold Italics"/>
-              </a:rPr>
-              <a:t>Idee da </a:t>
-            </a:r>
-            <a:r>
-              <a:rPr lang="en-US" sz="2022" b="1" i="1" dirty="0" err="1">
-                <a:solidFill>
-                  <a:srgbClr val="000000"/>
-                </a:solidFill>
-                <a:latin typeface="Montserrat Bold Italics"/>
-                <a:ea typeface="Montserrat Bold Italics"/>
-                <a:cs typeface="Montserrat Bold Italics"/>
-                <a:sym typeface="Montserrat Bold Italics"/>
-              </a:rPr>
-              <a:t>condividere</a:t>
-            </a:r>
-            <a:r>
-              <a:rPr lang="en-US" sz="2022" b="1" i="1" dirty="0">
-                <a:solidFill>
-                  <a:srgbClr val="000000"/>
-                </a:solidFill>
-                <a:latin typeface="Montserrat Bold Italics"/>
-                <a:ea typeface="Montserrat Bold Italics"/>
-                <a:cs typeface="Montserrat Bold Italics"/>
-                <a:sym typeface="Montserrat Bold Italics"/>
-              </a:rPr>
-              <a:t>: </a:t>
+              <a:t>Riunioni interne di allineamento ogni due giorni</a:t>
             </a:r>
           </a:p>
           <a:p>
@@ -6767,230 +5931,15 @@
               <a:buChar char="•"/>
             </a:pPr>
             <a:r>
-              <a:rPr lang="en-US" sz="2022" dirty="0">
+              <a:rPr lang="it-IT" sz="2600" dirty="0">
                 <a:solidFill>
                   <a:srgbClr val="000000"/>
                 </a:solidFill>
-                <a:latin typeface="Montserrat"/>
-                <a:ea typeface="Montserrat"/>
-                <a:cs typeface="Montserrat"/>
-                <a:sym typeface="Montserrat"/>
-              </a:rPr>
-              <a:t>Template standard per </a:t>
-            </a:r>
-            <a:r>
-              <a:rPr lang="en-US" sz="2022" dirty="0" err="1">
-                <a:solidFill>
-                  <a:srgbClr val="000000"/>
-                </a:solidFill>
-                <a:latin typeface="Montserrat"/>
-                <a:ea typeface="Montserrat"/>
-                <a:cs typeface="Montserrat"/>
-                <a:sym typeface="Montserrat"/>
-              </a:rPr>
-              <a:t>verbali</a:t>
-            </a:r>
-            <a:endParaRPr lang="en-US" sz="2022" dirty="0">
-              <a:solidFill>
-                <a:srgbClr val="000000"/>
-              </a:solidFill>
-              <a:latin typeface="Montserrat"/>
-              <a:ea typeface="Montserrat"/>
-              <a:cs typeface="Montserrat"/>
-              <a:sym typeface="Montserrat"/>
-            </a:endParaRPr>
-          </a:p>
-          <a:p>
-            <a:pPr marL="436733" lvl="1" indent="-218366" algn="l">
-              <a:lnSpc>
-                <a:spcPct val="150000"/>
-              </a:lnSpc>
-              <a:buFont typeface="Arial"/>
-              <a:buChar char="•"/>
-            </a:pPr>
-            <a:r>
-              <a:rPr lang="en-US" sz="2022" i="1" dirty="0" err="1">
-                <a:solidFill>
-                  <a:srgbClr val="000000"/>
-                </a:solidFill>
-                <a:latin typeface="Montserrat Italics"/>
-                <a:ea typeface="Montserrat Italics"/>
-                <a:cs typeface="Montserrat Italics"/>
+                <a:latin typeface="Overpass" panose="020B0604020202020204" charset="0"/>
                 <a:sym typeface="Montserrat Italics"/>
               </a:rPr>
-              <a:t>Riunioni</a:t>
-            </a:r>
-            <a:r>
-              <a:rPr lang="en-US" sz="2022" i="1" dirty="0">
-                <a:solidFill>
-                  <a:srgbClr val="000000"/>
-                </a:solidFill>
-                <a:latin typeface="Montserrat Italics"/>
-                <a:ea typeface="Montserrat Italics"/>
-                <a:cs typeface="Montserrat Italics"/>
-                <a:sym typeface="Montserrat Italics"/>
-              </a:rPr>
-              <a:t> interne di </a:t>
-            </a:r>
-            <a:r>
-              <a:rPr lang="en-US" sz="2022" i="1" dirty="0" err="1">
-                <a:solidFill>
-                  <a:srgbClr val="000000"/>
-                </a:solidFill>
-                <a:latin typeface="Montserrat Italics"/>
-                <a:ea typeface="Montserrat Italics"/>
-                <a:cs typeface="Montserrat Italics"/>
-                <a:sym typeface="Montserrat Italics"/>
-              </a:rPr>
-              <a:t>un’ora</a:t>
-            </a:r>
-            <a:r>
-              <a:rPr lang="en-US" sz="2022" i="1" dirty="0">
-                <a:solidFill>
-                  <a:srgbClr val="000000"/>
-                </a:solidFill>
-                <a:latin typeface="Montserrat Italics"/>
-                <a:ea typeface="Montserrat Italics"/>
-                <a:cs typeface="Montserrat Italics"/>
-                <a:sym typeface="Montserrat Italics"/>
-              </a:rPr>
-              <a:t> ogni due </a:t>
-            </a:r>
-            <a:r>
-              <a:rPr lang="en-US" sz="2022" i="1" dirty="0" err="1">
-                <a:solidFill>
-                  <a:srgbClr val="000000"/>
-                </a:solidFill>
-                <a:latin typeface="Montserrat Italics"/>
-                <a:ea typeface="Montserrat Italics"/>
-                <a:cs typeface="Montserrat Italics"/>
-                <a:sym typeface="Montserrat Italics"/>
-              </a:rPr>
-              <a:t>giorni</a:t>
-            </a:r>
-            <a:endParaRPr lang="en-US" sz="2022" i="1" dirty="0">
-              <a:solidFill>
-                <a:srgbClr val="000000"/>
-              </a:solidFill>
-              <a:latin typeface="Montserrat Italics"/>
-              <a:ea typeface="Montserrat Italics"/>
-              <a:cs typeface="Montserrat Italics"/>
-              <a:sym typeface="Montserrat Italics"/>
-            </a:endParaRPr>
-          </a:p>
-          <a:p>
-            <a:pPr marL="436733" lvl="1" indent="-218366" algn="l">
-              <a:lnSpc>
-                <a:spcPct val="150000"/>
-              </a:lnSpc>
-              <a:buFont typeface="Arial"/>
-              <a:buChar char="•"/>
-            </a:pPr>
-            <a:r>
-              <a:rPr lang="en-US" sz="2022" i="1" dirty="0">
-                <a:solidFill>
-                  <a:srgbClr val="000000"/>
-                </a:solidFill>
-                <a:latin typeface="Montserrat Italics"/>
-                <a:ea typeface="Montserrat Italics"/>
-                <a:cs typeface="Montserrat Italics"/>
-                <a:sym typeface="Montserrat Italics"/>
-              </a:rPr>
-              <a:t>Repository GitHub dove </a:t>
-            </a:r>
-            <a:r>
-              <a:rPr lang="en-US" sz="2022" i="1" dirty="0" err="1">
-                <a:solidFill>
-                  <a:srgbClr val="000000"/>
-                </a:solidFill>
-                <a:latin typeface="Montserrat Italics"/>
-                <a:ea typeface="Montserrat Italics"/>
-                <a:cs typeface="Montserrat Italics"/>
-                <a:sym typeface="Montserrat Italics"/>
-              </a:rPr>
-              <a:t>condividere</a:t>
-            </a:r>
-            <a:r>
-              <a:rPr lang="en-US" sz="2022" i="1" dirty="0">
-                <a:solidFill>
-                  <a:srgbClr val="000000"/>
-                </a:solidFill>
-                <a:latin typeface="Montserrat Italics"/>
-                <a:ea typeface="Montserrat Italics"/>
-                <a:cs typeface="Montserrat Italics"/>
-                <a:sym typeface="Montserrat Italics"/>
-              </a:rPr>
-              <a:t> </a:t>
-            </a:r>
-            <a:r>
-              <a:rPr lang="en-US" sz="2022" i="1" dirty="0" err="1">
-                <a:solidFill>
-                  <a:srgbClr val="000000"/>
-                </a:solidFill>
-                <a:latin typeface="Montserrat Italics"/>
-                <a:ea typeface="Montserrat Italics"/>
-                <a:cs typeface="Montserrat Italics"/>
-                <a:sym typeface="Montserrat Italics"/>
-              </a:rPr>
-              <a:t>i</a:t>
-            </a:r>
-            <a:r>
-              <a:rPr lang="en-US" sz="2022" i="1" dirty="0">
-                <a:solidFill>
-                  <a:srgbClr val="000000"/>
-                </a:solidFill>
-                <a:latin typeface="Montserrat Italics"/>
-                <a:ea typeface="Montserrat Italics"/>
-                <a:cs typeface="Montserrat Italics"/>
-                <a:sym typeface="Montserrat Italics"/>
-              </a:rPr>
-              <a:t> file e </a:t>
-            </a:r>
-            <a:r>
-              <a:rPr lang="en-US" sz="2022" i="1" dirty="0" err="1">
-                <a:solidFill>
-                  <a:srgbClr val="000000"/>
-                </a:solidFill>
-                <a:latin typeface="Montserrat Italics"/>
-                <a:ea typeface="Montserrat Italics"/>
-                <a:cs typeface="Montserrat Italics"/>
-                <a:sym typeface="Montserrat Italics"/>
-              </a:rPr>
-              <a:t>documenti</a:t>
-            </a:r>
-            <a:r>
-              <a:rPr lang="en-US" sz="2022" i="1" dirty="0">
-                <a:solidFill>
-                  <a:srgbClr val="000000"/>
-                </a:solidFill>
-                <a:latin typeface="Montserrat Italics"/>
-                <a:ea typeface="Montserrat Italics"/>
-                <a:cs typeface="Montserrat Italics"/>
-                <a:sym typeface="Montserrat Italics"/>
-              </a:rPr>
-              <a:t> </a:t>
-            </a:r>
-            <a:r>
-              <a:rPr lang="en-US" sz="2022" i="1" dirty="0" err="1">
-                <a:solidFill>
-                  <a:srgbClr val="000000"/>
-                </a:solidFill>
-                <a:latin typeface="Montserrat Italics"/>
-                <a:ea typeface="Montserrat Italics"/>
-                <a:cs typeface="Montserrat Italics"/>
-                <a:sym typeface="Montserrat Italics"/>
-              </a:rPr>
-              <a:t>utili</a:t>
-            </a:r>
-            <a:endParaRPr lang="en-US" sz="2022" i="1" dirty="0">
-              <a:solidFill>
-                <a:srgbClr val="000000"/>
-              </a:solidFill>
-              <a:latin typeface="Montserrat Italics"/>
-              <a:ea typeface="Montserrat Italics"/>
-              <a:cs typeface="Montserrat Italics"/>
-              <a:sym typeface="Montserrat Italics"/>
-            </a:endParaRPr>
+              <a:t>Repository GitHub dove condividere i file e documenti utili</a:t>
+            </a:r>
           </a:p>
         </p:txBody>
       </p:sp>
@@ -7283,4 +6232,319 @@
   <a:objectDefaults/>
   <a:extraClrSchemeLst/>
 </a:theme>
+</file>
+
+<file path=ppt/theme/theme2.xml><?xml version="1.0" encoding="utf-8"?>
+<a:theme xmlns:a="http://schemas.openxmlformats.org/drawingml/2006/main" name="Tema di Office">
+  <a:themeElements>
+    <a:clrScheme name="Office">
+      <a:dk1>
+        <a:sysClr val="windowText" lastClr="000000"/>
+      </a:dk1>
+      <a:lt1>
+        <a:sysClr val="window" lastClr="FFFFFF"/>
+      </a:lt1>
+      <a:dk2>
+        <a:srgbClr val="0E2841"/>
+      </a:dk2>
+      <a:lt2>
+        <a:srgbClr val="E8E8E8"/>
+      </a:lt2>
+      <a:accent1>
+        <a:srgbClr val="156082"/>
+      </a:accent1>
+      <a:accent2>
+        <a:srgbClr val="E97132"/>
+      </a:accent2>
+      <a:accent3>
+        <a:srgbClr val="196B24"/>
+      </a:accent3>
+      <a:accent4>
+        <a:srgbClr val="0F9ED5"/>
+      </a:accent4>
+      <a:accent5>
+        <a:srgbClr val="A02B93"/>
+      </a:accent5>
+      <a:accent6>
+        <a:srgbClr val="4EA72E"/>
+      </a:accent6>
+      <a:hlink>
+        <a:srgbClr val="467886"/>
+      </a:hlink>
+      <a:folHlink>
+        <a:srgbClr val="96607D"/>
+      </a:folHlink>
+    </a:clrScheme>
+    <a:fontScheme name="Office">
+      <a:majorFont>
+        <a:latin typeface="Aptos Display" panose="02110004020202020204"/>
+        <a:ea typeface=""/>
+        <a:cs typeface=""/>
+        <a:font script="Jpan" typeface="游ゴシック Light"/>
+        <a:font script="Hang" typeface="맑은 고딕"/>
+        <a:font script="Hans" typeface="等线 Light"/>
+        <a:font script="Hant" typeface="新細明體"/>
+        <a:font script="Arab" typeface="Times New Roman"/>
+        <a:font script="Hebr" typeface="Times New Roman"/>
+        <a:font script="Thai" typeface="Angsana New"/>
+        <a:font script="Ethi" typeface="Nyala"/>
+        <a:font script="Beng" typeface="Vrinda"/>
+        <a:font script="Gujr" typeface="Shruti"/>
+        <a:font script="Khmr" typeface="MoolBoran"/>
+        <a:font script="Knda" typeface="Tunga"/>
+        <a:font script="Guru" typeface="Raavi"/>
+        <a:font script="Cans" typeface="Euphemia"/>
+        <a:font script="Cher" typeface="Plantagenet Cherokee"/>
+        <a:font script="Yiii" typeface="Microsoft Yi Baiti"/>
+        <a:font script="Tibt" typeface="Microsoft Himalaya"/>
+        <a:font script="Thaa" typeface="MV Boli"/>
+        <a:font script="Deva" typeface="Mangal"/>
+        <a:font script="Telu" typeface="Gautami"/>
+        <a:font script="Taml" typeface="Latha"/>
+        <a:font script="Syrc" typeface="Estrangelo Edessa"/>
+        <a:font script="Orya" typeface="Kalinga"/>
+        <a:font script="Mlym" typeface="Kartika"/>
+        <a:font script="Laoo" typeface="DokChampa"/>
+        <a:font script="Sinh" typeface="Iskoola Pota"/>
+        <a:font script="Mong" typeface="Mongolian Baiti"/>
+        <a:font script="Viet" typeface="Times New Roman"/>
+        <a:font script="Uigh" typeface="Microsoft Uighur"/>
+        <a:font script="Geor" typeface="Sylfaen"/>
+        <a:font script="Armn" typeface="Arial"/>
+        <a:font script="Bugi" typeface="Leelawadee UI"/>
+        <a:font script="Bopo" typeface="Microsoft JhengHei"/>
+        <a:font script="Java" typeface="Javanese Text"/>
+        <a:font script="Lisu" typeface="Segoe UI"/>
+        <a:font script="Mymr" typeface="Myanmar Text"/>
+        <a:font script="Nkoo" typeface="Ebrima"/>
+        <a:font script="Olck" typeface="Nirmala UI"/>
+        <a:font script="Osma" typeface="Ebrima"/>
+        <a:font script="Phag" typeface="Phagspa"/>
+        <a:font script="Syrn" typeface="Estrangelo Edessa"/>
+        <a:font script="Syrj" typeface="Estrangelo Edessa"/>
+        <a:font script="Syre" typeface="Estrangelo Edessa"/>
+        <a:font script="Sora" typeface="Nirmala UI"/>
+        <a:font script="Tale" typeface="Microsoft Tai Le"/>
+        <a:font script="Talu" typeface="Microsoft New Tai Lue"/>
+        <a:font script="Tfng" typeface="Ebrima"/>
+      </a:majorFont>
+      <a:minorFont>
+        <a:latin typeface="Aptos" panose="02110004020202020204"/>
+        <a:ea typeface=""/>
+        <a:cs typeface=""/>
+        <a:font script="Jpan" typeface="游ゴシック"/>
+        <a:font script="Hang" typeface="맑은 고딕"/>
+        <a:font script="Hans" typeface="等线"/>
+        <a:font script="Hant" typeface="新細明體"/>
+        <a:font script="Arab" typeface="Arial"/>
+        <a:font script="Hebr" typeface="Arial"/>
+        <a:font script="Thai" typeface="Cordia New"/>
+        <a:font script="Ethi" typeface="Nyala"/>
+        <a:font script="Beng" typeface="Vrinda"/>
+        <a:font script="Gujr" typeface="Shruti"/>
+        <a:font script="Khmr" typeface="DaunPenh"/>
+        <a:font script="Knda" typeface="Tunga"/>
+        <a:font script="Guru" typeface="Raavi"/>
+        <a:font script="Cans" typeface="Euphemia"/>
+        <a:font script="Cher" typeface="Plantagenet Cherokee"/>
+        <a:font script="Yiii" typeface="Microsoft Yi Baiti"/>
+        <a:font script="Tibt" typeface="Microsoft Himalaya"/>
+        <a:font script="Thaa" typeface="MV Boli"/>
+        <a:font script="Deva" typeface="Mangal"/>
+        <a:font script="Telu" typeface="Gautami"/>
+        <a:font script="Taml" typeface="Latha"/>
+        <a:font script="Syrc" typeface="Estrangelo Edessa"/>
+        <a:font script="Orya" typeface="Kalinga"/>
+        <a:font script="Mlym" typeface="Kartika"/>
+        <a:font script="Laoo" typeface="DokChampa"/>
+        <a:font script="Sinh" typeface="Iskoola Pota"/>
+        <a:font script="Mong" typeface="Mongolian Baiti"/>
+        <a:font script="Viet" typeface="Arial"/>
+        <a:font script="Uigh" typeface="Microsoft Uighur"/>
+        <a:font script="Geor" typeface="Sylfaen"/>
+        <a:font script="Armn" typeface="Arial"/>
+        <a:font script="Bugi" typeface="Leelawadee UI"/>
+        <a:font script="Bopo" typeface="Microsoft JhengHei"/>
+        <a:font script="Java" typeface="Javanese Text"/>
+        <a:font script="Lisu" typeface="Segoe UI"/>
+        <a:font script="Mymr" typeface="Myanmar Text"/>
+        <a:font script="Nkoo" typeface="Ebrima"/>
+        <a:font script="Olck" typeface="Nirmala UI"/>
+        <a:font script="Osma" typeface="Ebrima"/>
+        <a:font script="Phag" typeface="Phagspa"/>
+        <a:font script="Syrn" typeface="Estrangelo Edessa"/>
+        <a:font script="Syrj" typeface="Estrangelo Edessa"/>
+        <a:font script="Syre" typeface="Estrangelo Edessa"/>
+        <a:font script="Sora" typeface="Nirmala UI"/>
+        <a:font script="Tale" typeface="Microsoft Tai Le"/>
+        <a:font script="Talu" typeface="Microsoft New Tai Lue"/>
+        <a:font script="Tfng" typeface="Ebrima"/>
+      </a:minorFont>
+    </a:fontScheme>
+    <a:fmtScheme name="Office">
+      <a:fillStyleLst>
+        <a:solidFill>
+          <a:schemeClr val="phClr"/>
+        </a:solidFill>
+        <a:gradFill rotWithShape="1">
+          <a:gsLst>
+            <a:gs pos="0">
+              <a:schemeClr val="phClr">
+                <a:lumMod val="110000"/>
+                <a:satMod val="105000"/>
+                <a:tint val="67000"/>
+              </a:schemeClr>
+            </a:gs>
+            <a:gs pos="50000">
+              <a:schemeClr val="phClr">
+                <a:lumMod val="105000"/>
+                <a:satMod val="103000"/>
+                <a:tint val="73000"/>
+              </a:schemeClr>
+            </a:gs>
+            <a:gs pos="100000">
+              <a:schemeClr val="phClr">
+                <a:lumMod val="105000"/>
+                <a:satMod val="109000"/>
+                <a:tint val="81000"/>
+              </a:schemeClr>
+            </a:gs>
+          </a:gsLst>
+          <a:lin ang="5400000" scaled="0"/>
+        </a:gradFill>
+        <a:gradFill rotWithShape="1">
+          <a:gsLst>
+            <a:gs pos="0">
+              <a:schemeClr val="phClr">
+                <a:satMod val="103000"/>
+                <a:lumMod val="102000"/>
+                <a:tint val="94000"/>
+              </a:schemeClr>
+            </a:gs>
+            <a:gs pos="50000">
+              <a:schemeClr val="phClr">
+                <a:satMod val="110000"/>
+                <a:lumMod val="100000"/>
+                <a:shade val="100000"/>
+              </a:schemeClr>
+            </a:gs>
+            <a:gs pos="100000">
+              <a:schemeClr val="phClr">
+                <a:lumMod val="99000"/>
+                <a:satMod val="120000"/>
+                <a:shade val="78000"/>
+              </a:schemeClr>
+            </a:gs>
+          </a:gsLst>
+          <a:lin ang="5400000" scaled="0"/>
+        </a:gradFill>
+      </a:fillStyleLst>
+      <a:lnStyleLst>
+        <a:ln w="12700" cap="flat" cmpd="sng" algn="ctr">
+          <a:solidFill>
+            <a:schemeClr val="phClr"/>
+          </a:solidFill>
+          <a:prstDash val="solid"/>
+          <a:miter lim="800000"/>
+        </a:ln>
+        <a:ln w="19050" cap="flat" cmpd="sng" algn="ctr">
+          <a:solidFill>
+            <a:schemeClr val="phClr"/>
+          </a:solidFill>
+          <a:prstDash val="solid"/>
+          <a:miter lim="800000"/>
+        </a:ln>
+        <a:ln w="25400" cap="flat" cmpd="sng" algn="ctr">
+          <a:solidFill>
+            <a:schemeClr val="phClr"/>
+          </a:solidFill>
+          <a:prstDash val="solid"/>
+          <a:miter lim="800000"/>
+        </a:ln>
+      </a:lnStyleLst>
+      <a:effectStyleLst>
+        <a:effectStyle>
+          <a:effectLst/>
+        </a:effectStyle>
+        <a:effectStyle>
+          <a:effectLst/>
+        </a:effectStyle>
+        <a:effectStyle>
+          <a:effectLst>
+            <a:outerShdw blurRad="57150" dist="19050" dir="5400000" algn="ctr" rotWithShape="0">
+              <a:srgbClr val="000000">
+                <a:alpha val="63000"/>
+              </a:srgbClr>
+            </a:outerShdw>
+          </a:effectLst>
+        </a:effectStyle>
+      </a:effectStyleLst>
+      <a:bgFillStyleLst>
+        <a:solidFill>
+          <a:schemeClr val="phClr"/>
+        </a:solidFill>
+        <a:solidFill>
+          <a:schemeClr val="phClr">
+            <a:tint val="95000"/>
+            <a:satMod val="170000"/>
+          </a:schemeClr>
+        </a:solidFill>
+        <a:gradFill rotWithShape="1">
+          <a:gsLst>
+            <a:gs pos="0">
+              <a:schemeClr val="phClr">
+                <a:tint val="93000"/>
+                <a:satMod val="150000"/>
+                <a:shade val="98000"/>
+                <a:lumMod val="102000"/>
+              </a:schemeClr>
+            </a:gs>
+            <a:gs pos="50000">
+              <a:schemeClr val="phClr">
+                <a:tint val="98000"/>
+                <a:satMod val="130000"/>
+                <a:shade val="90000"/>
+                <a:lumMod val="103000"/>
+              </a:schemeClr>
+            </a:gs>
+            <a:gs pos="100000">
+              <a:schemeClr val="phClr">
+                <a:shade val="63000"/>
+                <a:satMod val="120000"/>
+              </a:schemeClr>
+            </a:gs>
+          </a:gsLst>
+          <a:lin ang="5400000" scaled="0"/>
+        </a:gradFill>
+      </a:bgFillStyleLst>
+    </a:fmtScheme>
+  </a:themeElements>
+  <a:objectDefaults>
+    <a:lnDef>
+      <a:spPr/>
+      <a:bodyPr/>
+      <a:lstStyle/>
+      <a:style>
+        <a:lnRef idx="2">
+          <a:schemeClr val="accent1"/>
+        </a:lnRef>
+        <a:fillRef idx="0">
+          <a:schemeClr val="accent1"/>
+        </a:fillRef>
+        <a:effectRef idx="1">
+          <a:schemeClr val="accent1"/>
+        </a:effectRef>
+        <a:fontRef idx="minor">
+          <a:schemeClr val="tx1"/>
+        </a:fontRef>
+      </a:style>
+    </a:lnDef>
+  </a:objectDefaults>
+  <a:extraClrSchemeLst/>
+  <a:extLst>
+    <a:ext uri="{05A4C25C-085E-4340-85A3-A5531E510DB2}">
+      <thm15:themeFamily xmlns:thm15="http://schemas.microsoft.com/office/thememl/2012/main" name="Office Theme" id="{2E142A2C-CD16-42D6-873A-C26D2A0506FA}" vid="{1BDDFF52-6CD6-40A5-AB3C-68EB2F1E4D0A}"/>
+    </a:ext>
+  </a:extLst>
+</a:theme>
 </file>
</xml_diff>

<commit_message>
aggiornamento diario di bordo
</commit_message>
<xml_diff>
--- a/DIARIO DI BORDO/Diario di bordo.pptx
+++ b/DIARIO DI BORDO/Diario di bordo.pptx
@@ -241,7 +241,7 @@
           <a:p>
             <a:fld id="{DC233B30-4F8C-4A4C-AB5E-3B02323E36F5}" type="datetimeFigureOut">
               <a:rPr lang="it-IT" smtClean="0"/>
-              <a:t>26/10/2025</a:t>
+              <a:t>27/10/2025</a:t>
             </a:fld>
             <a:endParaRPr lang="it-IT"/>
           </a:p>
@@ -772,7 +772,7 @@
             <a:fld id="{1D8BD707-D9CF-40AE-B4C6-C98DA3205C09}" type="datetimeFigureOut">
               <a:rPr lang="en-US" smtClean="0"/>
               <a:pPr/>
-              <a:t>10/26/2025</a:t>
+              <a:t>10/27/2025</a:t>
             </a:fld>
             <a:endParaRPr lang="en-US"/>
           </a:p>
@@ -937,7 +937,7 @@
             <a:fld id="{1D8BD707-D9CF-40AE-B4C6-C98DA3205C09}" type="datetimeFigureOut">
               <a:rPr lang="en-US" smtClean="0"/>
               <a:pPr/>
-              <a:t>10/26/2025</a:t>
+              <a:t>10/27/2025</a:t>
             </a:fld>
             <a:endParaRPr lang="en-US"/>
           </a:p>
@@ -1112,7 +1112,7 @@
             <a:fld id="{1D8BD707-D9CF-40AE-B4C6-C98DA3205C09}" type="datetimeFigureOut">
               <a:rPr lang="en-US" smtClean="0"/>
               <a:pPr/>
-              <a:t>10/26/2025</a:t>
+              <a:t>10/27/2025</a:t>
             </a:fld>
             <a:endParaRPr lang="en-US"/>
           </a:p>
@@ -1277,7 +1277,7 @@
             <a:fld id="{1D8BD707-D9CF-40AE-B4C6-C98DA3205C09}" type="datetimeFigureOut">
               <a:rPr lang="en-US" smtClean="0"/>
               <a:pPr/>
-              <a:t>10/26/2025</a:t>
+              <a:t>10/27/2025</a:t>
             </a:fld>
             <a:endParaRPr lang="en-US"/>
           </a:p>
@@ -1519,7 +1519,7 @@
             <a:fld id="{1D8BD707-D9CF-40AE-B4C6-C98DA3205C09}" type="datetimeFigureOut">
               <a:rPr lang="en-US" smtClean="0"/>
               <a:pPr/>
-              <a:t>10/26/2025</a:t>
+              <a:t>10/27/2025</a:t>
             </a:fld>
             <a:endParaRPr lang="en-US"/>
           </a:p>
@@ -1801,7 +1801,7 @@
             <a:fld id="{1D8BD707-D9CF-40AE-B4C6-C98DA3205C09}" type="datetimeFigureOut">
               <a:rPr lang="en-US" smtClean="0"/>
               <a:pPr/>
-              <a:t>10/26/2025</a:t>
+              <a:t>10/27/2025</a:t>
             </a:fld>
             <a:endParaRPr lang="en-US"/>
           </a:p>
@@ -2217,7 +2217,7 @@
             <a:fld id="{1D8BD707-D9CF-40AE-B4C6-C98DA3205C09}" type="datetimeFigureOut">
               <a:rPr lang="en-US" smtClean="0"/>
               <a:pPr/>
-              <a:t>10/26/2025</a:t>
+              <a:t>10/27/2025</a:t>
             </a:fld>
             <a:endParaRPr lang="en-US"/>
           </a:p>
@@ -2331,7 +2331,7 @@
             <a:fld id="{1D8BD707-D9CF-40AE-B4C6-C98DA3205C09}" type="datetimeFigureOut">
               <a:rPr lang="en-US" smtClean="0"/>
               <a:pPr/>
-              <a:t>10/26/2025</a:t>
+              <a:t>10/27/2025</a:t>
             </a:fld>
             <a:endParaRPr lang="en-US"/>
           </a:p>
@@ -2423,7 +2423,7 @@
             <a:fld id="{1D8BD707-D9CF-40AE-B4C6-C98DA3205C09}" type="datetimeFigureOut">
               <a:rPr lang="en-US" smtClean="0"/>
               <a:pPr/>
-              <a:t>10/26/2025</a:t>
+              <a:t>10/27/2025</a:t>
             </a:fld>
             <a:endParaRPr lang="en-US"/>
           </a:p>
@@ -2695,7 +2695,7 @@
             <a:fld id="{1D8BD707-D9CF-40AE-B4C6-C98DA3205C09}" type="datetimeFigureOut">
               <a:rPr lang="en-US" smtClean="0"/>
               <a:pPr/>
-              <a:t>10/26/2025</a:t>
+              <a:t>10/27/2025</a:t>
             </a:fld>
             <a:endParaRPr lang="en-US"/>
           </a:p>
@@ -2944,7 +2944,7 @@
             <a:fld id="{1D8BD707-D9CF-40AE-B4C6-C98DA3205C09}" type="datetimeFigureOut">
               <a:rPr lang="en-US" smtClean="0"/>
               <a:pPr/>
-              <a:t>10/26/2025</a:t>
+              <a:t>10/27/2025</a:t>
             </a:fld>
             <a:endParaRPr lang="en-US"/>
           </a:p>
@@ -3152,7 +3152,7 @@
             <a:fld id="{1D8BD707-D9CF-40AE-B4C6-C98DA3205C09}" type="datetimeFigureOut">
               <a:rPr lang="en-US" smtClean="0"/>
               <a:pPr/>
-              <a:t>10/26/2025</a:t>
+              <a:t>10/27/2025</a:t>
             </a:fld>
             <a:endParaRPr lang="en-US"/>
           </a:p>
@@ -5872,7 +5872,7 @@
         <p:spPr>
           <a:xfrm>
             <a:off x="12800132" y="3766930"/>
-            <a:ext cx="4867811" cy="4222438"/>
+            <a:ext cx="4867811" cy="4822602"/>
           </a:xfrm>
           <a:prstGeom prst="rect">
             <a:avLst/>
@@ -5919,7 +5919,7 @@
                 <a:latin typeface="Overpass" panose="020B0604020202020204" charset="0"/>
                 <a:sym typeface="Montserrat Italics"/>
               </a:rPr>
-              <a:t>Riunioni interne di allineamento ogni due giorni</a:t>
+              <a:t>Riunioni interne di allineamento (pianificate in un calendario condiviso)</a:t>
             </a:r>
           </a:p>
           <a:p>

</xml_diff>